<commit_message>
azure monitor extension, VM names adjusted
</commit_message>
<xml_diff>
--- a/diagrams.pptx
+++ b/diagrams.pptx
@@ -15,6 +15,8 @@
     <p:sldId id="264" r:id="rId9"/>
     <p:sldId id="262" r:id="rId10"/>
     <p:sldId id="265" r:id="rId11"/>
+    <p:sldId id="266" r:id="rId12"/>
+    <p:sldId id="267" r:id="rId13"/>
   </p:sldIdLst>
   <p:sldSz cx="12192000" cy="6858000"/>
   <p:notesSz cx="6858000" cy="9144000"/>
@@ -121,6 +123,84 @@
 </p:presentation>
 </file>
 
+<file path=ppt/ink/ink1.xml><?xml version="1.0" encoding="utf-8"?>
+<inkml:ink xmlns:inkml="http://www.w3.org/2003/InkML">
+  <inkml:definitions>
+    <inkml:context xml:id="ctx0">
+      <inkml:inkSource xml:id="inkSrc0">
+        <inkml:traceFormat>
+          <inkml:channel name="X" type="integer" min="-2.14748E9" max="2.14748E9" units="cm"/>
+          <inkml:channel name="Y" type="integer" min="-2.14748E9" max="2.14748E9" units="cm"/>
+          <inkml:channel name="F" type="integer" max="32767" units="dev"/>
+        </inkml:traceFormat>
+        <inkml:channelProperties>
+          <inkml:channelProperty channel="X" name="resolution" value="1000" units="1/cm"/>
+          <inkml:channelProperty channel="Y" name="resolution" value="1000" units="1/cm"/>
+          <inkml:channelProperty channel="F" name="resolution" value="0" units="1/dev"/>
+        </inkml:channelProperties>
+      </inkml:inkSource>
+      <inkml:timestamp xml:id="ts0" timeString="2017-04-11T09:22:02.714"/>
+    </inkml:context>
+    <inkml:brush xml:id="br0">
+      <inkml:brushProperty name="width" value="0.10583" units="cm"/>
+      <inkml:brushProperty name="height" value="0.10583" units="cm"/>
+      <inkml:brushProperty name="color" value="#548235"/>
+    </inkml:brush>
+  </inkml:definitions>
+  <inkml:traceGroup>
+    <inkml:annotationXML>
+      <emma:emma xmlns:emma="http://www.w3.org/2003/04/emma" version="1.0">
+        <emma:interpretation id="{B43356B7-5BA2-451B-AA2A-D97560A56471}" emma:medium="tactile" emma:mode="ink">
+          <msink:context xmlns:msink="http://schemas.microsoft.com/ink/2010/main" type="inkDrawing" rotatedBoundingBox="10507,6032 20345,4300 21613,11507 11776,13238" shapeName="Other">
+            <msink:destinationLink direction="with" ref="{B75386F5-7A50-4601-8FF0-323E459C1110}"/>
+          </msink:context>
+        </emma:interpretation>
+      </emma:emma>
+    </inkml:annotationXML>
+    <inkml:trace contextRef="#ctx0" brushRef="#br0">12038 13801 4992,'0'-14'1920,"0"14"-1024,14-28-704,0 13 544,-14 1-384,14 0-32,0 0 0,29-14 128,-15 0-256,14-15-256,15 1-96,-15 0 64,15-15 96,-1 1 96,0-15 32,1 15-64,13-1-64,1 1 576,0-1 320,13 1-320,-13-15-64,-1 1-320,15-1-64,14 1-64,0-1-64,-1 1-64,1-15 32,0 0-128,-14 1 32,13-1 192,1 0 128,14 1 96,-14-1 160,-15-14-128,15 15 64,0-15-224,-14 14-32,-1 0-64,1 1-64,0-1 32,-15 0 32,15 1-32,-29-15-32,15 14 32,-1-13-32,15 13 0,-14 0 0,-1 1 0,-13-15 0,-1 0 0,1 0 64,-15 0-96,0 15 0,-14-1 96,1 0 32,-1 1-32,0-1-64,-14 15 32,0-15-32,0 0 0,-14 15 64,15-1-32,-15-14-32,0 15 32,0 13 32,0-13 32,-15 13 96,-13 1 32,0 0 32,0-15-65,-15 15-31,15 13 96,-14-13 96,0-1-192,-1 1-32,-27-1 0,13 15 0,1-14-160,-1 13-32,-13 1-64,-1 0 96,1-1-64,-29 15-32,0-14 0,0 14 0,1-1 96,-1 1 64,-28 14 0,14-14 64,-14 14 0,14-15 32,-14 15-64,0 0-64,0-14 96,14 0 0,14 0-32,15-1-64,-1-13 32,0 14-32,29-15-96,-29-13 64,29 14-32,13-15-64,15 1-64,0 13 32,28-27 96,28 13 32,-14-13-64,29-15 64,13 15-128,1-1 32,13 1 64,1-1 32,42 15-63,-1-15-1,1 15 64,14-1 0,29-13 32,-1 27 64,0-13-32,28 13-32,-13 1-64,13 0-32,29 14-32,0-1 96,-15 15 64,29 0 128,14 1 0,0-2 63,0 15-63,-1 15 0,1-2-192,0 15-32,14 15-64,14-1 96,-14 14 64,14-13 64,1 27-128,-15-13 32,-15 13 0,30 15 64,-44 0 160,1 13 128,0 15-192,-29 0-96,-13 14-32,13 14-32,-27 0 0,-1 1 0,-28 13 0,0 14 64,0 15-96,-28-1 0,0 15 32,-42-15 64,-1 29-32,-13-1 64,-43 1 64,0 14 64,-28-15-32,-14 15-32,-15 0-32,-27-14 0,-15-1 0,0 15 0,-27-28 0,-1-1 0,-14 1 128,0-15 96,-14-13 160,14-1 64,-15-28-96,15 0 32,15-28-224,13-14-96,0-29-96,28 1-96,29-1-256,0-27-160,28-15-1280,0 0-544,28-14-2111,0-28-2081,0-14 2208</inkml:trace>
+  </inkml:traceGroup>
+</inkml:ink>
+</file>
+
+<file path=ppt/ink/ink2.xml><?xml version="1.0" encoding="utf-8"?>
+<inkml:ink xmlns:inkml="http://www.w3.org/2003/InkML">
+  <inkml:definitions>
+    <inkml:context xml:id="ctx0">
+      <inkml:inkSource xml:id="inkSrc0">
+        <inkml:traceFormat>
+          <inkml:channel name="X" type="integer" min="-2.14748E9" max="2.14748E9" units="cm"/>
+          <inkml:channel name="Y" type="integer" min="-2.14748E9" max="2.14748E9" units="cm"/>
+          <inkml:channel name="F" type="integer" max="32767" units="dev"/>
+        </inkml:traceFormat>
+        <inkml:channelProperties>
+          <inkml:channelProperty channel="X" name="resolution" value="1000" units="1/cm"/>
+          <inkml:channelProperty channel="Y" name="resolution" value="1000" units="1/cm"/>
+          <inkml:channelProperty channel="F" name="resolution" value="0" units="1/dev"/>
+        </inkml:channelProperties>
+      </inkml:inkSource>
+      <inkml:timestamp xml:id="ts0" timeString="2017-04-11T09:22:27.596"/>
+    </inkml:context>
+    <inkml:brush xml:id="br0">
+      <inkml:brushProperty name="width" value="0.10583" units="cm"/>
+      <inkml:brushProperty name="height" value="0.10583" units="cm"/>
+      <inkml:brushProperty name="color" value="#C00000"/>
+    </inkml:brush>
+  </inkml:definitions>
+  <inkml:traceGroup>
+    <inkml:annotationXML>
+      <emma:emma xmlns:emma="http://www.w3.org/2003/04/emma" version="1.0">
+        <emma:interpretation id="{B75386F5-7A50-4601-8FF0-323E459C1110}" emma:medium="tactile" emma:mode="ink">
+          <msink:context xmlns:msink="http://schemas.microsoft.com/ink/2010/main" type="inkDrawing" rotatedBoundingBox="11725,3534 22553,4535 21774,12966 10945,11965" semanticType="callout" shapeName="Other">
+            <msink:sourceLink direction="with" ref="{B43356B7-5BA2-451B-AA2A-D97560A56471}"/>
+          </msink:context>
+        </emma:interpretation>
+      </emma:emma>
+    </inkml:annotationXML>
+    <inkml:trace contextRef="#ctx0" brushRef="#br0">20264 13351 3968,'14'0'1568,"-14"-14"-832,14 0-928,0 14 192,0-14-256,14 14-64,-13-28-288,13 14 0,1-15 96,-1 1 160,14-14 256,0 14 128,0-15 160,1 1 32,-1-14 320,1 13 128,-15 1 0,28-15-32,-14 1-256,15-15-160,-14 15-64,13-15-32,14 15-64,1-29-128,0 15 32,13-15-32,0-14 0,-12 15 128,12-15 32,0 0-128,-13 0 32,0 1 128,-1-15 160,1 14 32,0-14 128,-15 0-160,0 14-32,-14-28-64,1 14-32,14 0-32,-15 0 64,0 0 32,0-14 96,0 0-32,1 0 64,-14 0 0,13 0 32,-14 0-64,-14 0 32,14-28 0,-14 14 32,-14 0 0,0-1 0,0 1-128,-14 0 0,0 14-32,-14 0 96,0 0 32,-29-14 96,15 14-96,-1 14 32,-27-14-161,14 0 33,-15 14-96,0 0 64,1 0-128,-29-14 0,14 14-32,-13 28 32,-1-28 0,-14 15 96,0-1-32,-14 0 64,14 0-128,-28 15 0,0-1 32,0-14 0,-15 15-64,16-1-64,-16 0 32,1 1 32,0-1-96,-1 14 0,-12 1-32,-2-1 0,14 1 0,-26-1 0,12 15 64,0-1 64,-27 1-32,14-1-32,-1 15 32,-14 0-32,15-1 0,0 15 0,-29 0 0,28 0 64,-13 14-96,0-15 0,13 29 32,-14-14 64,15 14-32,-14-14-32,13 14-64,14 14 32,-12-14-32,12 14 0,0 0 64,16 15 64,-16-15-32,15 28-32,0-14 32,13 15-32,2 13 0,-2 1 64,30-1-32,-2 15 64,-12-1-64,-2 1-32,2 27-64,12-13 32,16 28-32,-15-14 0,0 0 128,0 28 96,14-15-128,1 15-96,13 0 96,0 0 32,15 0-160,-15 15 0,14-15 96,1 0 64,0 28 0,-1-14-64,14 0-64,15 1-32,-14 13 64,14-14 64,-1 14 0,-14 14-32,15-13 32,14-1-32,-14 14-96,0-14 64,13 15 32,1 0 0,-1-15 0,-13 14 0,14-14 0,0 29 64,0-15-32,14 1-32,0-1-64,0-14-32,14 0 64,-15 1 64,15 13-64,0-13 0,0-1 32,0 0 0,0 0 64,0-14 32,-14 0-32,14-14-64,0 0 32,0-14-32,0 0 128,0-28 160,-14-15 32,14-13 64,0 13-128,-14-13-96,14-15-160,0-14-64,0-13-480,0-1-128,0 0-1280</inkml:trace>
+  </inkml:traceGroup>
+</inkml:ink>
+</file>
+
 <file path=ppt/slideLayouts/slideLayout1.xml><?xml version="1.0" encoding="utf-8"?>
 <p:sldLayout xmlns:a="http://schemas.openxmlformats.org/drawingml/2006/main" xmlns:r="http://schemas.openxmlformats.org/officeDocument/2006/relationships" xmlns:p="http://schemas.openxmlformats.org/presentationml/2006/main" type="title" preserve="1">
   <p:cSld name="Title Slide">
@@ -250,7 +330,7 @@
           <a:p>
             <a:fld id="{DCC0AA99-36AE-4579-9809-446917AEEC33}" type="datetimeFigureOut">
               <a:rPr lang="en-US" smtClean="0"/>
-              <a:t>3/27/2017</a:t>
+              <a:t>4/11/2017</a:t>
             </a:fld>
             <a:endParaRPr lang="en-US"/>
           </a:p>
@@ -418,7 +498,7 @@
           <a:p>
             <a:fld id="{DCC0AA99-36AE-4579-9809-446917AEEC33}" type="datetimeFigureOut">
               <a:rPr lang="en-US" smtClean="0"/>
-              <a:t>3/27/2017</a:t>
+              <a:t>4/11/2017</a:t>
             </a:fld>
             <a:endParaRPr lang="en-US"/>
           </a:p>
@@ -596,7 +676,7 @@
           <a:p>
             <a:fld id="{DCC0AA99-36AE-4579-9809-446917AEEC33}" type="datetimeFigureOut">
               <a:rPr lang="en-US" smtClean="0"/>
-              <a:t>3/27/2017</a:t>
+              <a:t>4/11/2017</a:t>
             </a:fld>
             <a:endParaRPr lang="en-US"/>
           </a:p>
@@ -764,7 +844,7 @@
           <a:p>
             <a:fld id="{DCC0AA99-36AE-4579-9809-446917AEEC33}" type="datetimeFigureOut">
               <a:rPr lang="en-US" smtClean="0"/>
-              <a:t>3/27/2017</a:t>
+              <a:t>4/11/2017</a:t>
             </a:fld>
             <a:endParaRPr lang="en-US"/>
           </a:p>
@@ -1009,7 +1089,7 @@
           <a:p>
             <a:fld id="{DCC0AA99-36AE-4579-9809-446917AEEC33}" type="datetimeFigureOut">
               <a:rPr lang="en-US" smtClean="0"/>
-              <a:t>3/27/2017</a:t>
+              <a:t>4/11/2017</a:t>
             </a:fld>
             <a:endParaRPr lang="en-US"/>
           </a:p>
@@ -1238,7 +1318,7 @@
           <a:p>
             <a:fld id="{DCC0AA99-36AE-4579-9809-446917AEEC33}" type="datetimeFigureOut">
               <a:rPr lang="en-US" smtClean="0"/>
-              <a:t>3/27/2017</a:t>
+              <a:t>4/11/2017</a:t>
             </a:fld>
             <a:endParaRPr lang="en-US"/>
           </a:p>
@@ -1602,7 +1682,7 @@
           <a:p>
             <a:fld id="{DCC0AA99-36AE-4579-9809-446917AEEC33}" type="datetimeFigureOut">
               <a:rPr lang="en-US" smtClean="0"/>
-              <a:t>3/27/2017</a:t>
+              <a:t>4/11/2017</a:t>
             </a:fld>
             <a:endParaRPr lang="en-US"/>
           </a:p>
@@ -1719,7 +1799,7 @@
           <a:p>
             <a:fld id="{DCC0AA99-36AE-4579-9809-446917AEEC33}" type="datetimeFigureOut">
               <a:rPr lang="en-US" smtClean="0"/>
-              <a:t>3/27/2017</a:t>
+              <a:t>4/11/2017</a:t>
             </a:fld>
             <a:endParaRPr lang="en-US"/>
           </a:p>
@@ -1814,7 +1894,7 @@
           <a:p>
             <a:fld id="{DCC0AA99-36AE-4579-9809-446917AEEC33}" type="datetimeFigureOut">
               <a:rPr lang="en-US" smtClean="0"/>
-              <a:t>3/27/2017</a:t>
+              <a:t>4/11/2017</a:t>
             </a:fld>
             <a:endParaRPr lang="en-US"/>
           </a:p>
@@ -2089,7 +2169,7 @@
           <a:p>
             <a:fld id="{DCC0AA99-36AE-4579-9809-446917AEEC33}" type="datetimeFigureOut">
               <a:rPr lang="en-US" smtClean="0"/>
-              <a:t>3/27/2017</a:t>
+              <a:t>4/11/2017</a:t>
             </a:fld>
             <a:endParaRPr lang="en-US"/>
           </a:p>
@@ -2341,7 +2421,7 @@
           <a:p>
             <a:fld id="{DCC0AA99-36AE-4579-9809-446917AEEC33}" type="datetimeFigureOut">
               <a:rPr lang="en-US" smtClean="0"/>
-              <a:t>3/27/2017</a:t>
+              <a:t>4/11/2017</a:t>
             </a:fld>
             <a:endParaRPr lang="en-US"/>
           </a:p>
@@ -2552,7 +2632,7 @@
           <a:p>
             <a:fld id="{DCC0AA99-36AE-4579-9809-446917AEEC33}" type="datetimeFigureOut">
               <a:rPr lang="en-US" smtClean="0"/>
-              <a:t>3/27/2017</a:t>
+              <a:t>4/11/2017</a:t>
             </a:fld>
             <a:endParaRPr lang="en-US"/>
           </a:p>
@@ -4120,6 +4200,13 @@
                 </a:srgbClr>
               </a:clrTo>
             </a:clrChange>
+            <a:duotone>
+              <a:schemeClr val="accent6">
+                <a:shade val="45000"/>
+                <a:satMod val="135000"/>
+              </a:schemeClr>
+              <a:prstClr val="white"/>
+            </a:duotone>
             <a:extLst>
               <a:ext uri="{28A0092B-C50C-407E-A947-70E740481C1C}">
                 <a14:useLocalDpi xmlns:a14="http://schemas.microsoft.com/office/drawing/2010/main" val="0"/>
@@ -4169,6 +4256,13 @@
                 </a:srgbClr>
               </a:clrTo>
             </a:clrChange>
+            <a:duotone>
+              <a:schemeClr val="accent6">
+                <a:shade val="45000"/>
+                <a:satMod val="135000"/>
+              </a:schemeClr>
+              <a:prstClr val="white"/>
+            </a:duotone>
             <a:extLst>
               <a:ext uri="{28A0092B-C50C-407E-A947-70E740481C1C}">
                 <a14:useLocalDpi xmlns:a14="http://schemas.microsoft.com/office/drawing/2010/main" val="0"/>
@@ -4604,11 +4698,6 @@
               </a:rPr>
               <a:t>168.63.129.16</a:t>
             </a:r>
-            <a:endParaRPr lang="en-US" b="1" dirty="0">
-              <a:solidFill>
-                <a:schemeClr val="accent6"/>
-              </a:solidFill>
-            </a:endParaRPr>
           </a:p>
         </p:txBody>
       </p:sp>
@@ -4689,13 +4778,8 @@
             <a:pPr algn="ctr"/>
             <a:r>
               <a:rPr lang="en-US" dirty="0"/>
-              <a:t>Should I send traffic back to </a:t>
-            </a:r>
-            <a:r>
-              <a:rPr lang="en-US" dirty="0"/>
-              <a:t>168.63.129.16 over eth0 or eth1?</a:t>
-            </a:r>
-            <a:endParaRPr lang="en-US" dirty="0"/>
+              <a:t>Should I send traffic back to 168.63.129.16 over eth0 or eth1?</a:t>
+            </a:r>
           </a:p>
         </p:txBody>
       </p:sp>
@@ -4975,6 +5059,4557 @@
     <p:extLst>
       <p:ext uri="{BB962C8B-B14F-4D97-AF65-F5344CB8AC3E}">
         <p14:creationId xmlns:p14="http://schemas.microsoft.com/office/powerpoint/2010/main" val="2742233758"/>
+      </p:ext>
+    </p:extLst>
+  </p:cSld>
+  <p:clrMapOvr>
+    <a:masterClrMapping/>
+  </p:clrMapOvr>
+</p:sld>
+</file>
+
+<file path=ppt/slides/slide11.xml><?xml version="1.0" encoding="utf-8"?>
+<p:sld xmlns:a="http://schemas.openxmlformats.org/drawingml/2006/main" xmlns:r="http://schemas.openxmlformats.org/officeDocument/2006/relationships" xmlns:p="http://schemas.openxmlformats.org/presentationml/2006/main">
+  <p:cSld>
+    <p:spTree>
+      <p:nvGrpSpPr>
+        <p:cNvPr id="1" name=""/>
+        <p:cNvGrpSpPr/>
+        <p:nvPr/>
+      </p:nvGrpSpPr>
+      <p:grpSpPr>
+        <a:xfrm>
+          <a:off x="0" y="0"/>
+          <a:ext cx="0" cy="0"/>
+          <a:chOff x="0" y="0"/>
+          <a:chExt cx="0" cy="0"/>
+        </a:xfrm>
+      </p:grpSpPr>
+      <p:sp>
+        <p:nvSpPr>
+          <p:cNvPr id="11" name="Rectangle 10"/>
+          <p:cNvSpPr/>
+          <p:nvPr/>
+        </p:nvSpPr>
+        <p:spPr>
+          <a:xfrm>
+            <a:off x="3182593" y="1831235"/>
+            <a:ext cx="1252829" cy="1159924"/>
+          </a:xfrm>
+          <a:prstGeom prst="rect">
+            <a:avLst/>
+          </a:prstGeom>
+          <a:solidFill>
+            <a:schemeClr val="accent6">
+              <a:lumMod val="20000"/>
+              <a:lumOff val="80000"/>
+            </a:schemeClr>
+          </a:solidFill>
+          <a:ln>
+            <a:solidFill>
+              <a:schemeClr val="accent6">
+                <a:lumMod val="75000"/>
+              </a:schemeClr>
+            </a:solidFill>
+          </a:ln>
+        </p:spPr>
+        <p:style>
+          <a:lnRef idx="2">
+            <a:schemeClr val="accent1">
+              <a:shade val="50000"/>
+            </a:schemeClr>
+          </a:lnRef>
+          <a:fillRef idx="1">
+            <a:schemeClr val="accent1"/>
+          </a:fillRef>
+          <a:effectRef idx="0">
+            <a:schemeClr val="accent1"/>
+          </a:effectRef>
+          <a:fontRef idx="minor">
+            <a:schemeClr val="lt1"/>
+          </a:fontRef>
+        </p:style>
+        <p:txBody>
+          <a:bodyPr rtlCol="0" anchor="ctr"/>
+          <a:lstStyle/>
+          <a:p>
+            <a:pPr algn="ctr"/>
+            <a:endParaRPr lang="en-US"/>
+          </a:p>
+        </p:txBody>
+      </p:sp>
+      <p:sp>
+        <p:nvSpPr>
+          <p:cNvPr id="46" name="Arrow: Curved Right 45"/>
+          <p:cNvSpPr/>
+          <p:nvPr/>
+        </p:nvSpPr>
+        <p:spPr>
+          <a:xfrm rot="16200000" flipH="1">
+            <a:off x="4691155" y="2041558"/>
+            <a:ext cx="1507000" cy="3258799"/>
+          </a:xfrm>
+          <a:prstGeom prst="curvedRightArrow">
+            <a:avLst/>
+          </a:prstGeom>
+          <a:solidFill>
+            <a:schemeClr val="accent1">
+              <a:lumMod val="20000"/>
+              <a:lumOff val="80000"/>
+            </a:schemeClr>
+          </a:solidFill>
+        </p:spPr>
+        <p:style>
+          <a:lnRef idx="2">
+            <a:schemeClr val="accent1">
+              <a:shade val="50000"/>
+            </a:schemeClr>
+          </a:lnRef>
+          <a:fillRef idx="1">
+            <a:schemeClr val="accent1"/>
+          </a:fillRef>
+          <a:effectRef idx="0">
+            <a:schemeClr val="accent1"/>
+          </a:effectRef>
+          <a:fontRef idx="minor">
+            <a:schemeClr val="lt1"/>
+          </a:fontRef>
+        </p:style>
+        <p:txBody>
+          <a:bodyPr rtlCol="0" anchor="ctr"/>
+          <a:lstStyle/>
+          <a:p>
+            <a:pPr algn="ctr"/>
+            <a:endParaRPr lang="en-US">
+              <a:solidFill>
+                <a:schemeClr val="tx1"/>
+              </a:solidFill>
+            </a:endParaRPr>
+          </a:p>
+        </p:txBody>
+      </p:sp>
+      <p:sp>
+        <p:nvSpPr>
+          <p:cNvPr id="2" name="Title 1"/>
+          <p:cNvSpPr>
+            <a:spLocks noGrp="1"/>
+          </p:cNvSpPr>
+          <p:nvPr>
+            <p:ph type="title"/>
+          </p:nvPr>
+        </p:nvSpPr>
+        <p:spPr>
+          <a:xfrm>
+            <a:off x="804080" y="-3435"/>
+            <a:ext cx="10515600" cy="1325563"/>
+          </a:xfrm>
+        </p:spPr>
+        <p:txBody>
+          <a:bodyPr/>
+          <a:lstStyle/>
+          <a:p>
+            <a:r>
+              <a:rPr lang="de-DE" dirty="0"/>
+              <a:t>NVA VM Scale Set</a:t>
+            </a:r>
+            <a:endParaRPr lang="en-US" dirty="0"/>
+          </a:p>
+        </p:txBody>
+      </p:sp>
+      <p:grpSp>
+        <p:nvGrpSpPr>
+          <p:cNvPr id="33" name="Group 32"/>
+          <p:cNvGrpSpPr/>
+          <p:nvPr/>
+        </p:nvGrpSpPr>
+        <p:grpSpPr>
+          <a:xfrm>
+            <a:off x="3666434" y="3525449"/>
+            <a:ext cx="3487633" cy="242161"/>
+            <a:chOff x="1722437" y="4945062"/>
+            <a:chExt cx="4191000" cy="304800"/>
+          </a:xfrm>
+        </p:grpSpPr>
+        <p:cxnSp>
+          <p:nvCxnSpPr>
+            <p:cNvPr id="34" name="Straight Connector 33"/>
+            <p:cNvCxnSpPr/>
+            <p:nvPr/>
+          </p:nvCxnSpPr>
+          <p:spPr>
+            <a:xfrm>
+              <a:off x="1722437" y="5097462"/>
+              <a:ext cx="4191000" cy="0"/>
+            </a:xfrm>
+            <a:prstGeom prst="line">
+              <a:avLst/>
+            </a:prstGeom>
+            <a:ln>
+              <a:solidFill>
+                <a:schemeClr val="tx1"/>
+              </a:solidFill>
+              <a:headEnd type="none"/>
+              <a:tailEnd type="none"/>
+            </a:ln>
+          </p:spPr>
+          <p:style>
+            <a:lnRef idx="1">
+              <a:schemeClr val="accent1"/>
+            </a:lnRef>
+            <a:fillRef idx="0">
+              <a:schemeClr val="accent1"/>
+            </a:fillRef>
+            <a:effectRef idx="0">
+              <a:schemeClr val="accent1"/>
+            </a:effectRef>
+            <a:fontRef idx="minor">
+              <a:schemeClr val="tx1"/>
+            </a:fontRef>
+          </p:style>
+        </p:cxnSp>
+        <p:cxnSp>
+          <p:nvCxnSpPr>
+            <p:cNvPr id="35" name="Straight Connector 34"/>
+            <p:cNvCxnSpPr/>
+            <p:nvPr/>
+          </p:nvCxnSpPr>
+          <p:spPr>
+            <a:xfrm flipV="1">
+              <a:off x="1722437" y="4945062"/>
+              <a:ext cx="0" cy="304800"/>
+            </a:xfrm>
+            <a:prstGeom prst="line">
+              <a:avLst/>
+            </a:prstGeom>
+            <a:ln>
+              <a:solidFill>
+                <a:schemeClr val="tx1"/>
+              </a:solidFill>
+              <a:headEnd type="none"/>
+              <a:tailEnd type="none"/>
+            </a:ln>
+          </p:spPr>
+          <p:style>
+            <a:lnRef idx="1">
+              <a:schemeClr val="accent1"/>
+            </a:lnRef>
+            <a:fillRef idx="0">
+              <a:schemeClr val="accent1"/>
+            </a:fillRef>
+            <a:effectRef idx="0">
+              <a:schemeClr val="accent1"/>
+            </a:effectRef>
+            <a:fontRef idx="minor">
+              <a:schemeClr val="tx1"/>
+            </a:fontRef>
+          </p:style>
+        </p:cxnSp>
+        <p:cxnSp>
+          <p:nvCxnSpPr>
+            <p:cNvPr id="36" name="Straight Connector 35"/>
+            <p:cNvCxnSpPr/>
+            <p:nvPr/>
+          </p:nvCxnSpPr>
+          <p:spPr>
+            <a:xfrm flipV="1">
+              <a:off x="5913437" y="4945062"/>
+              <a:ext cx="0" cy="304800"/>
+            </a:xfrm>
+            <a:prstGeom prst="line">
+              <a:avLst/>
+            </a:prstGeom>
+            <a:ln>
+              <a:solidFill>
+                <a:schemeClr val="tx1"/>
+              </a:solidFill>
+              <a:headEnd type="none"/>
+              <a:tailEnd type="none"/>
+            </a:ln>
+          </p:spPr>
+          <p:style>
+            <a:lnRef idx="1">
+              <a:schemeClr val="accent1"/>
+            </a:lnRef>
+            <a:fillRef idx="0">
+              <a:schemeClr val="accent1"/>
+            </a:fillRef>
+            <a:effectRef idx="0">
+              <a:schemeClr val="accent1"/>
+            </a:effectRef>
+            <a:fontRef idx="minor">
+              <a:schemeClr val="tx1"/>
+            </a:fontRef>
+          </p:style>
+        </p:cxnSp>
+      </p:grpSp>
+      <p:sp>
+        <p:nvSpPr>
+          <p:cNvPr id="37" name="TextBox 36"/>
+          <p:cNvSpPr txBox="1"/>
+          <p:nvPr/>
+        </p:nvSpPr>
+        <p:spPr>
+          <a:xfrm>
+            <a:off x="5255132" y="3506221"/>
+            <a:ext cx="1212511" cy="489365"/>
+          </a:xfrm>
+          <a:prstGeom prst="rect">
+            <a:avLst/>
+          </a:prstGeom>
+          <a:noFill/>
+        </p:spPr>
+        <p:txBody>
+          <a:bodyPr wrap="none" lIns="182880" tIns="146304" rIns="182880" bIns="146304" rtlCol="0">
+            <a:spAutoFit/>
+          </a:bodyPr>
+          <a:lstStyle/>
+          <a:p>
+            <a:pPr>
+              <a:lnSpc>
+                <a:spcPct val="90000"/>
+              </a:lnSpc>
+              <a:spcAft>
+                <a:spcPts val="600"/>
+              </a:spcAft>
+            </a:pPr>
+            <a:r>
+              <a:rPr lang="en-US" sz="1400" dirty="0">
+                <a:solidFill>
+                  <a:schemeClr val="tx1">
+                    <a:lumMod val="65000"/>
+                    <a:lumOff val="35000"/>
+                  </a:schemeClr>
+                </a:solidFill>
+              </a:rPr>
+              <a:t>10.4.2.0/24</a:t>
+            </a:r>
+          </a:p>
+        </p:txBody>
+      </p:sp>
+      <p:cxnSp>
+        <p:nvCxnSpPr>
+          <p:cNvPr id="38" name="Straight Connector 37"/>
+          <p:cNvCxnSpPr/>
+          <p:nvPr/>
+        </p:nvCxnSpPr>
+        <p:spPr>
+          <a:xfrm flipH="1">
+            <a:off x="3875286" y="3051401"/>
+            <a:ext cx="4158" cy="595230"/>
+          </a:xfrm>
+          <a:prstGeom prst="line">
+            <a:avLst/>
+          </a:prstGeom>
+          <a:ln>
+            <a:solidFill>
+              <a:schemeClr val="tx1"/>
+            </a:solidFill>
+            <a:headEnd type="none"/>
+            <a:tailEnd type="none"/>
+          </a:ln>
+        </p:spPr>
+        <p:style>
+          <a:lnRef idx="1">
+            <a:schemeClr val="accent1"/>
+          </a:lnRef>
+          <a:fillRef idx="0">
+            <a:schemeClr val="accent1"/>
+          </a:fillRef>
+          <a:effectRef idx="0">
+            <a:schemeClr val="accent1"/>
+          </a:effectRef>
+          <a:fontRef idx="minor">
+            <a:schemeClr val="tx1"/>
+          </a:fontRef>
+        </p:style>
+      </p:cxnSp>
+      <p:pic>
+        <p:nvPicPr>
+          <p:cNvPr id="39" name="Picture 2" descr="http://design.ubuntu.com/wp-content/uploads/ubuntu-logo112.png"/>
+          <p:cNvPicPr>
+            <a:picLocks noChangeAspect="1" noChangeArrowheads="1"/>
+          </p:cNvPicPr>
+          <p:nvPr/>
+        </p:nvPicPr>
+        <p:blipFill rotWithShape="1">
+          <a:blip r:embed="rId2">
+            <a:clrChange>
+              <a:clrFrom>
+                <a:srgbClr val="FFFFFF"/>
+              </a:clrFrom>
+              <a:clrTo>
+                <a:srgbClr val="FFFFFF">
+                  <a:alpha val="0"/>
+                </a:srgbClr>
+              </a:clrTo>
+            </a:clrChange>
+            <a:duotone>
+              <a:schemeClr val="accent6">
+                <a:shade val="45000"/>
+                <a:satMod val="135000"/>
+              </a:schemeClr>
+              <a:prstClr val="white"/>
+            </a:duotone>
+            <a:extLst>
+              <a:ext uri="{28A0092B-C50C-407E-A947-70E740481C1C}">
+                <a14:useLocalDpi xmlns:a14="http://schemas.microsoft.com/office/drawing/2010/main" val="0"/>
+              </a:ext>
+            </a:extLst>
+          </a:blip>
+          <a:srcRect l="20695" r="23109" b="32515"/>
+          <a:stretch/>
+        </p:blipFill>
+        <p:spPr bwMode="auto">
+          <a:xfrm>
+            <a:off x="3323990" y="2027048"/>
+            <a:ext cx="656161" cy="627751"/>
+          </a:xfrm>
+          <a:prstGeom prst="rect">
+            <a:avLst/>
+          </a:prstGeom>
+          <a:noFill/>
+          <a:extLst>
+            <a:ext uri="{909E8E84-426E-40DD-AFC4-6F175D3DCCD1}">
+              <a14:hiddenFill xmlns:a14="http://schemas.microsoft.com/office/drawing/2010/main">
+                <a:solidFill>
+                  <a:srgbClr val="FFFFFF"/>
+                </a:solidFill>
+              </a14:hiddenFill>
+            </a:ext>
+          </a:extLst>
+        </p:spPr>
+      </p:pic>
+      <p:sp>
+        <p:nvSpPr>
+          <p:cNvPr id="41" name="TextBox 40"/>
+          <p:cNvSpPr txBox="1"/>
+          <p:nvPr/>
+        </p:nvSpPr>
+        <p:spPr>
+          <a:xfrm>
+            <a:off x="4241938" y="4576694"/>
+            <a:ext cx="1150956" cy="338554"/>
+          </a:xfrm>
+          <a:prstGeom prst="rect">
+            <a:avLst/>
+          </a:prstGeom>
+          <a:noFill/>
+        </p:spPr>
+        <p:txBody>
+          <a:bodyPr wrap="none" rtlCol="0">
+            <a:spAutoFit/>
+          </a:bodyPr>
+          <a:lstStyle/>
+          <a:p>
+            <a:r>
+              <a:rPr lang="de-DE" sz="1600" dirty="0">
+                <a:solidFill>
+                  <a:schemeClr val="tx1">
+                    <a:lumMod val="65000"/>
+                    <a:lumOff val="35000"/>
+                  </a:schemeClr>
+                </a:solidFill>
+              </a:rPr>
+              <a:t>Ubuntu VM</a:t>
+            </a:r>
+          </a:p>
+        </p:txBody>
+      </p:sp>
+      <p:sp>
+        <p:nvSpPr>
+          <p:cNvPr id="42" name="TextBox 41"/>
+          <p:cNvSpPr txBox="1"/>
+          <p:nvPr/>
+        </p:nvSpPr>
+        <p:spPr>
+          <a:xfrm>
+            <a:off x="7074862" y="4586470"/>
+            <a:ext cx="1150956" cy="338554"/>
+          </a:xfrm>
+          <a:prstGeom prst="rect">
+            <a:avLst/>
+          </a:prstGeom>
+          <a:noFill/>
+        </p:spPr>
+        <p:txBody>
+          <a:bodyPr wrap="none" rtlCol="0">
+            <a:spAutoFit/>
+          </a:bodyPr>
+          <a:lstStyle/>
+          <a:p>
+            <a:r>
+              <a:rPr lang="de-DE" sz="1600" dirty="0">
+                <a:solidFill>
+                  <a:schemeClr val="tx1">
+                    <a:lumMod val="65000"/>
+                    <a:lumOff val="35000"/>
+                  </a:schemeClr>
+                </a:solidFill>
+              </a:rPr>
+              <a:t>Ubuntu VM</a:t>
+            </a:r>
+          </a:p>
+        </p:txBody>
+      </p:sp>
+      <p:sp>
+        <p:nvSpPr>
+          <p:cNvPr id="45" name="TextBox 44"/>
+          <p:cNvSpPr txBox="1"/>
+          <p:nvPr/>
+        </p:nvSpPr>
+        <p:spPr>
+          <a:xfrm>
+            <a:off x="557723" y="5565315"/>
+            <a:ext cx="5228034" cy="1077218"/>
+          </a:xfrm>
+          <a:prstGeom prst="rect">
+            <a:avLst/>
+          </a:prstGeom>
+          <a:noFill/>
+          <a:ln>
+            <a:solidFill>
+              <a:schemeClr val="accent1"/>
+            </a:solidFill>
+          </a:ln>
+        </p:spPr>
+        <p:txBody>
+          <a:bodyPr wrap="none" rtlCol="0">
+            <a:spAutoFit/>
+          </a:bodyPr>
+          <a:lstStyle/>
+          <a:p>
+            <a:r>
+              <a:rPr lang="de-DE" sz="1600" b="1" dirty="0">
+                <a:solidFill>
+                  <a:schemeClr val="accent1"/>
+                </a:solidFill>
+              </a:rPr>
+              <a:t>UDR in vnet1-subnet1</a:t>
+            </a:r>
+            <a:r>
+              <a:rPr lang="de-DE" sz="1600" dirty="0">
+                <a:solidFill>
+                  <a:schemeClr val="accent1"/>
+                </a:solidFill>
+              </a:rPr>
+              <a:t>:</a:t>
+            </a:r>
+          </a:p>
+          <a:p>
+            <a:r>
+              <a:rPr lang="de-DE" sz="1600" dirty="0">
+                <a:solidFill>
+                  <a:schemeClr val="accent1"/>
+                </a:solidFill>
+              </a:rPr>
+              <a:t>10.1.1.0/24 -&gt; 10.4.2.100 (for intra-subnet traffic filtering)</a:t>
+            </a:r>
+          </a:p>
+          <a:p>
+            <a:r>
+              <a:rPr lang="de-DE" sz="1600" dirty="0">
+                <a:solidFill>
+                  <a:schemeClr val="accent1"/>
+                </a:solidFill>
+              </a:rPr>
+              <a:t>10.2.0.0/16 -&gt; 10.4.2.100 (for inter-vnet traffic filtering)</a:t>
+            </a:r>
+          </a:p>
+          <a:p>
+            <a:r>
+              <a:rPr lang="de-DE" sz="1600" dirty="0">
+                <a:solidFill>
+                  <a:schemeClr val="accent1"/>
+                </a:solidFill>
+              </a:rPr>
+              <a:t>0.0.0.0/0 -&gt; 10.4.2.100 (for Internet outgoing traffic filtering)</a:t>
+            </a:r>
+            <a:endParaRPr lang="en-US" sz="1600" dirty="0">
+              <a:solidFill>
+                <a:schemeClr val="accent1"/>
+              </a:solidFill>
+            </a:endParaRPr>
+          </a:p>
+        </p:txBody>
+      </p:sp>
+      <p:cxnSp>
+        <p:nvCxnSpPr>
+          <p:cNvPr id="44" name="Straight Connector 43"/>
+          <p:cNvCxnSpPr/>
+          <p:nvPr/>
+        </p:nvCxnSpPr>
+        <p:spPr>
+          <a:xfrm flipH="1">
+            <a:off x="5725121" y="3057751"/>
+            <a:ext cx="4158" cy="595230"/>
+          </a:xfrm>
+          <a:prstGeom prst="line">
+            <a:avLst/>
+          </a:prstGeom>
+          <a:ln>
+            <a:solidFill>
+              <a:schemeClr val="tx1"/>
+            </a:solidFill>
+            <a:headEnd type="none"/>
+            <a:tailEnd type="none"/>
+          </a:ln>
+        </p:spPr>
+        <p:style>
+          <a:lnRef idx="1">
+            <a:schemeClr val="accent1"/>
+          </a:lnRef>
+          <a:fillRef idx="0">
+            <a:schemeClr val="accent1"/>
+          </a:fillRef>
+          <a:effectRef idx="0">
+            <a:schemeClr val="accent1"/>
+          </a:effectRef>
+          <a:fontRef idx="minor">
+            <a:schemeClr val="tx1"/>
+          </a:fontRef>
+        </p:style>
+      </p:cxnSp>
+      <p:sp>
+        <p:nvSpPr>
+          <p:cNvPr id="49" name="TextBox 48"/>
+          <p:cNvSpPr txBox="1"/>
+          <p:nvPr/>
+        </p:nvSpPr>
+        <p:spPr>
+          <a:xfrm>
+            <a:off x="5637937" y="3359657"/>
+            <a:ext cx="548548" cy="338554"/>
+          </a:xfrm>
+          <a:prstGeom prst="rect">
+            <a:avLst/>
+          </a:prstGeom>
+          <a:noFill/>
+        </p:spPr>
+        <p:txBody>
+          <a:bodyPr wrap="none" rtlCol="0">
+            <a:spAutoFit/>
+          </a:bodyPr>
+          <a:lstStyle/>
+          <a:p>
+            <a:r>
+              <a:rPr lang="de-DE" sz="1600" b="1" dirty="0">
+                <a:solidFill>
+                  <a:schemeClr val="tx1">
+                    <a:lumMod val="65000"/>
+                    <a:lumOff val="35000"/>
+                  </a:schemeClr>
+                </a:solidFill>
+              </a:rPr>
+              <a:t>.100</a:t>
+            </a:r>
+          </a:p>
+        </p:txBody>
+      </p:sp>
+      <p:pic>
+        <p:nvPicPr>
+          <p:cNvPr id="50" name="Picture 2" descr="http://design.ubuntu.com/wp-content/uploads/ubuntu-logo112.png"/>
+          <p:cNvPicPr>
+            <a:picLocks noChangeAspect="1" noChangeArrowheads="1"/>
+          </p:cNvPicPr>
+          <p:nvPr/>
+        </p:nvPicPr>
+        <p:blipFill rotWithShape="1">
+          <a:blip r:embed="rId2">
+            <a:clrChange>
+              <a:clrFrom>
+                <a:srgbClr val="FFFFFF"/>
+              </a:clrFrom>
+              <a:clrTo>
+                <a:srgbClr val="FFFFFF">
+                  <a:alpha val="0"/>
+                </a:srgbClr>
+              </a:clrTo>
+            </a:clrChange>
+            <a:duotone>
+              <a:schemeClr val="accent6">
+                <a:shade val="45000"/>
+                <a:satMod val="135000"/>
+              </a:schemeClr>
+              <a:prstClr val="white"/>
+            </a:duotone>
+            <a:extLst>
+              <a:ext uri="{28A0092B-C50C-407E-A947-70E740481C1C}">
+                <a14:useLocalDpi xmlns:a14="http://schemas.microsoft.com/office/drawing/2010/main" val="0"/>
+              </a:ext>
+            </a:extLst>
+          </a:blip>
+          <a:srcRect l="20695" r="23109" b="32515"/>
+          <a:stretch/>
+        </p:blipFill>
+        <p:spPr bwMode="auto">
+          <a:xfrm>
+            <a:off x="3515449" y="2168627"/>
+            <a:ext cx="656161" cy="627751"/>
+          </a:xfrm>
+          <a:prstGeom prst="rect">
+            <a:avLst/>
+          </a:prstGeom>
+          <a:noFill/>
+          <a:extLst>
+            <a:ext uri="{909E8E84-426E-40DD-AFC4-6F175D3DCCD1}">
+              <a14:hiddenFill xmlns:a14="http://schemas.microsoft.com/office/drawing/2010/main">
+                <a:solidFill>
+                  <a:srgbClr val="FFFFFF"/>
+                </a:solidFill>
+              </a14:hiddenFill>
+            </a:ext>
+          </a:extLst>
+        </p:spPr>
+      </p:pic>
+      <p:pic>
+        <p:nvPicPr>
+          <p:cNvPr id="3078" name="Picture 6" descr="https://azure.microsoft.com/svghandler/load-balancer/?width=600&amp;height=315"/>
+          <p:cNvPicPr>
+            <a:picLocks noChangeAspect="1" noChangeArrowheads="1"/>
+          </p:cNvPicPr>
+          <p:nvPr/>
+        </p:nvPicPr>
+        <p:blipFill rotWithShape="1">
+          <a:blip r:embed="rId3">
+            <a:extLst>
+              <a:ext uri="{28A0092B-C50C-407E-A947-70E740481C1C}">
+                <a14:useLocalDpi xmlns:a14="http://schemas.microsoft.com/office/drawing/2010/main" val="0"/>
+              </a:ext>
+            </a:extLst>
+          </a:blip>
+          <a:srcRect l="20489" r="23142"/>
+          <a:stretch/>
+        </p:blipFill>
+        <p:spPr bwMode="auto">
+          <a:xfrm>
+            <a:off x="5262561" y="2494294"/>
+            <a:ext cx="891178" cy="830007"/>
+          </a:xfrm>
+          <a:prstGeom prst="rect">
+            <a:avLst/>
+          </a:prstGeom>
+          <a:noFill/>
+          <a:extLst>
+            <a:ext uri="{909E8E84-426E-40DD-AFC4-6F175D3DCCD1}">
+              <a14:hiddenFill xmlns:a14="http://schemas.microsoft.com/office/drawing/2010/main">
+                <a:solidFill>
+                  <a:srgbClr val="FFFFFF"/>
+                </a:solidFill>
+              </a14:hiddenFill>
+            </a:ext>
+          </a:extLst>
+        </p:spPr>
+      </p:pic>
+      <p:sp>
+        <p:nvSpPr>
+          <p:cNvPr id="51" name="TextBox 50"/>
+          <p:cNvSpPr txBox="1"/>
+          <p:nvPr/>
+        </p:nvSpPr>
+        <p:spPr>
+          <a:xfrm>
+            <a:off x="2593411" y="1301403"/>
+            <a:ext cx="2552716" cy="584775"/>
+          </a:xfrm>
+          <a:prstGeom prst="rect">
+            <a:avLst/>
+          </a:prstGeom>
+          <a:noFill/>
+        </p:spPr>
+        <p:txBody>
+          <a:bodyPr wrap="square" rtlCol="0">
+            <a:spAutoFit/>
+          </a:bodyPr>
+          <a:lstStyle/>
+          <a:p>
+            <a:pPr algn="ctr"/>
+            <a:r>
+              <a:rPr lang="de-DE" sz="1600" dirty="0">
+                <a:solidFill>
+                  <a:schemeClr val="accent6">
+                    <a:lumMod val="75000"/>
+                  </a:schemeClr>
+                </a:solidFill>
+              </a:rPr>
+              <a:t>VMSS with Linux-based NVAs (iptables)</a:t>
+            </a:r>
+          </a:p>
+        </p:txBody>
+      </p:sp>
+      <p:sp>
+        <p:nvSpPr>
+          <p:cNvPr id="52" name="TextBox 51"/>
+          <p:cNvSpPr txBox="1"/>
+          <p:nvPr/>
+        </p:nvSpPr>
+        <p:spPr>
+          <a:xfrm>
+            <a:off x="5912211" y="2445447"/>
+            <a:ext cx="1079847" cy="338554"/>
+          </a:xfrm>
+          <a:prstGeom prst="rect">
+            <a:avLst/>
+          </a:prstGeom>
+          <a:noFill/>
+        </p:spPr>
+        <p:txBody>
+          <a:bodyPr wrap="none" rtlCol="0">
+            <a:spAutoFit/>
+          </a:bodyPr>
+          <a:lstStyle/>
+          <a:p>
+            <a:pPr algn="ctr"/>
+            <a:r>
+              <a:rPr lang="de-DE" sz="1600" dirty="0">
+                <a:solidFill>
+                  <a:schemeClr val="tx1">
+                    <a:lumMod val="65000"/>
+                    <a:lumOff val="35000"/>
+                  </a:schemeClr>
+                </a:solidFill>
+              </a:rPr>
+              <a:t>Internal LB</a:t>
+            </a:r>
+          </a:p>
+        </p:txBody>
+      </p:sp>
+      <p:sp>
+        <p:nvSpPr>
+          <p:cNvPr id="53" name="TextBox 52"/>
+          <p:cNvSpPr txBox="1"/>
+          <p:nvPr/>
+        </p:nvSpPr>
+        <p:spPr>
+          <a:xfrm>
+            <a:off x="7356348" y="2556558"/>
+            <a:ext cx="3876843" cy="1815882"/>
+          </a:xfrm>
+          <a:prstGeom prst="rect">
+            <a:avLst/>
+          </a:prstGeom>
+          <a:noFill/>
+          <a:ln w="12700">
+            <a:solidFill>
+              <a:schemeClr val="accent1"/>
+            </a:solidFill>
+          </a:ln>
+        </p:spPr>
+        <p:txBody>
+          <a:bodyPr wrap="square" rtlCol="0">
+            <a:spAutoFit/>
+          </a:bodyPr>
+          <a:lstStyle/>
+          <a:p>
+            <a:r>
+              <a:rPr lang="de-DE" sz="1600" b="1" dirty="0">
+                <a:solidFill>
+                  <a:schemeClr val="accent1"/>
+                </a:solidFill>
+              </a:rPr>
+              <a:t>SNAT</a:t>
+            </a:r>
+            <a:r>
+              <a:rPr lang="de-DE" sz="1600" dirty="0">
+                <a:solidFill>
+                  <a:schemeClr val="accent1"/>
+                </a:solidFill>
+              </a:rPr>
+              <a:t>:</a:t>
+            </a:r>
+          </a:p>
+          <a:p>
+            <a:r>
+              <a:rPr lang="de-DE" sz="1600" dirty="0">
+                <a:solidFill>
+                  <a:schemeClr val="accent1"/>
+                </a:solidFill>
+              </a:rPr>
+              <a:t>each firewall source-nats the traffic to its own address, in order to attract return traffic and thus prevent asymmetric routing</a:t>
+            </a:r>
+          </a:p>
+          <a:p>
+            <a:r>
+              <a:rPr lang="de-DE" sz="1600" b="1" dirty="0">
+                <a:solidFill>
+                  <a:schemeClr val="accent1"/>
+                </a:solidFill>
+              </a:rPr>
+              <a:t>DSR:</a:t>
+            </a:r>
+          </a:p>
+          <a:p>
+            <a:r>
+              <a:rPr lang="en-US" sz="1600" dirty="0">
+                <a:solidFill>
+                  <a:schemeClr val="accent1"/>
+                </a:solidFill>
+              </a:rPr>
+              <a:t>DSR rules (today port-specific) forward traffic to one of the NVAs</a:t>
+            </a:r>
+          </a:p>
+        </p:txBody>
+      </p:sp>
+      <p:sp>
+        <p:nvSpPr>
+          <p:cNvPr id="54" name="TextBox 53"/>
+          <p:cNvSpPr txBox="1"/>
+          <p:nvPr/>
+        </p:nvSpPr>
+        <p:spPr>
+          <a:xfrm>
+            <a:off x="220805" y="1772192"/>
+            <a:ext cx="2249892" cy="830997"/>
+          </a:xfrm>
+          <a:prstGeom prst="rect">
+            <a:avLst/>
+          </a:prstGeom>
+          <a:noFill/>
+          <a:ln>
+            <a:solidFill>
+              <a:schemeClr val="accent1"/>
+            </a:solidFill>
+          </a:ln>
+        </p:spPr>
+        <p:txBody>
+          <a:bodyPr wrap="square" rtlCol="0">
+            <a:spAutoFit/>
+          </a:bodyPr>
+          <a:lstStyle/>
+          <a:p>
+            <a:r>
+              <a:rPr lang="de-DE" sz="1600" b="1" dirty="0">
+                <a:solidFill>
+                  <a:schemeClr val="accent1"/>
+                </a:solidFill>
+              </a:rPr>
+              <a:t>Single-NIC</a:t>
+            </a:r>
+            <a:r>
+              <a:rPr lang="de-DE" sz="1600" dirty="0">
+                <a:solidFill>
+                  <a:schemeClr val="accent1"/>
+                </a:solidFill>
+              </a:rPr>
+              <a:t>:</a:t>
+            </a:r>
+          </a:p>
+          <a:p>
+            <a:r>
+              <a:rPr lang="de-DE" sz="1600" dirty="0">
+                <a:solidFill>
+                  <a:schemeClr val="accent1"/>
+                </a:solidFill>
+              </a:rPr>
+              <a:t>VM Scale Sets support only single-NIC VMs</a:t>
+            </a:r>
+            <a:endParaRPr lang="en-US" sz="1600" dirty="0">
+              <a:solidFill>
+                <a:schemeClr val="accent1"/>
+              </a:solidFill>
+            </a:endParaRPr>
+          </a:p>
+        </p:txBody>
+      </p:sp>
+      <p:pic>
+        <p:nvPicPr>
+          <p:cNvPr id="55" name="Picture 2" descr="http://design.ubuntu.com/wp-content/uploads/ubuntu-logo112.png"/>
+          <p:cNvPicPr>
+            <a:picLocks noChangeAspect="1" noChangeArrowheads="1"/>
+          </p:cNvPicPr>
+          <p:nvPr/>
+        </p:nvPicPr>
+        <p:blipFill rotWithShape="1">
+          <a:blip r:embed="rId2">
+            <a:clrChange>
+              <a:clrFrom>
+                <a:srgbClr val="FFFFFF"/>
+              </a:clrFrom>
+              <a:clrTo>
+                <a:srgbClr val="FFFFFF">
+                  <a:alpha val="0"/>
+                </a:srgbClr>
+              </a:clrTo>
+            </a:clrChange>
+            <a:duotone>
+              <a:schemeClr val="accent6">
+                <a:shade val="45000"/>
+                <a:satMod val="135000"/>
+              </a:schemeClr>
+              <a:prstClr val="white"/>
+            </a:duotone>
+            <a:extLst>
+              <a:ext uri="{28A0092B-C50C-407E-A947-70E740481C1C}">
+                <a14:useLocalDpi xmlns:a14="http://schemas.microsoft.com/office/drawing/2010/main" val="0"/>
+              </a:ext>
+            </a:extLst>
+          </a:blip>
+          <a:srcRect l="20695" r="23109" b="32515"/>
+          <a:stretch/>
+        </p:blipFill>
+        <p:spPr bwMode="auto">
+          <a:xfrm>
+            <a:off x="3692077" y="2311991"/>
+            <a:ext cx="656161" cy="627751"/>
+          </a:xfrm>
+          <a:prstGeom prst="rect">
+            <a:avLst/>
+          </a:prstGeom>
+          <a:noFill/>
+          <a:extLst>
+            <a:ext uri="{909E8E84-426E-40DD-AFC4-6F175D3DCCD1}">
+              <a14:hiddenFill xmlns:a14="http://schemas.microsoft.com/office/drawing/2010/main">
+                <a:solidFill>
+                  <a:srgbClr val="FFFFFF"/>
+                </a:solidFill>
+              </a14:hiddenFill>
+            </a:ext>
+          </a:extLst>
+        </p:spPr>
+      </p:pic>
+      <p:pic>
+        <p:nvPicPr>
+          <p:cNvPr id="56" name="Picture 6" descr="https://azure.microsoft.com/svghandler/load-balancer/?width=600&amp;height=315"/>
+          <p:cNvPicPr>
+            <a:picLocks noChangeAspect="1" noChangeArrowheads="1"/>
+          </p:cNvPicPr>
+          <p:nvPr/>
+        </p:nvPicPr>
+        <p:blipFill rotWithShape="1">
+          <a:blip r:embed="rId3">
+            <a:extLst>
+              <a:ext uri="{28A0092B-C50C-407E-A947-70E740481C1C}">
+                <a14:useLocalDpi xmlns:a14="http://schemas.microsoft.com/office/drawing/2010/main" val="0"/>
+              </a:ext>
+            </a:extLst>
+          </a:blip>
+          <a:srcRect l="20489" r="23142"/>
+          <a:stretch/>
+        </p:blipFill>
+        <p:spPr bwMode="auto">
+          <a:xfrm>
+            <a:off x="5283392" y="1530092"/>
+            <a:ext cx="891178" cy="830007"/>
+          </a:xfrm>
+          <a:prstGeom prst="rect">
+            <a:avLst/>
+          </a:prstGeom>
+          <a:noFill/>
+          <a:extLst>
+            <a:ext uri="{909E8E84-426E-40DD-AFC4-6F175D3DCCD1}">
+              <a14:hiddenFill xmlns:a14="http://schemas.microsoft.com/office/drawing/2010/main">
+                <a:solidFill>
+                  <a:srgbClr val="FFFFFF"/>
+                </a:solidFill>
+              </a14:hiddenFill>
+            </a:ext>
+          </a:extLst>
+        </p:spPr>
+      </p:pic>
+      <p:sp>
+        <p:nvSpPr>
+          <p:cNvPr id="57" name="TextBox 56"/>
+          <p:cNvSpPr txBox="1"/>
+          <p:nvPr/>
+        </p:nvSpPr>
+        <p:spPr>
+          <a:xfrm>
+            <a:off x="5927621" y="1467647"/>
+            <a:ext cx="1112805" cy="338554"/>
+          </a:xfrm>
+          <a:prstGeom prst="rect">
+            <a:avLst/>
+          </a:prstGeom>
+          <a:noFill/>
+        </p:spPr>
+        <p:txBody>
+          <a:bodyPr wrap="none" rtlCol="0">
+            <a:spAutoFit/>
+          </a:bodyPr>
+          <a:lstStyle/>
+          <a:p>
+            <a:pPr algn="ctr"/>
+            <a:r>
+              <a:rPr lang="de-DE" sz="1600" dirty="0">
+                <a:solidFill>
+                  <a:schemeClr val="tx1">
+                    <a:lumMod val="65000"/>
+                    <a:lumOff val="35000"/>
+                  </a:schemeClr>
+                </a:solidFill>
+              </a:rPr>
+              <a:t>External LB</a:t>
+            </a:r>
+          </a:p>
+        </p:txBody>
+      </p:sp>
+      <p:cxnSp>
+        <p:nvCxnSpPr>
+          <p:cNvPr id="14" name="Straight Connector 13"/>
+          <p:cNvCxnSpPr>
+            <a:stCxn id="3078" idx="3"/>
+            <a:endCxn id="53" idx="1"/>
+          </p:cNvCxnSpPr>
+          <p:nvPr/>
+        </p:nvCxnSpPr>
+        <p:spPr>
+          <a:xfrm>
+            <a:off x="6153739" y="2909298"/>
+            <a:ext cx="1202609" cy="555201"/>
+          </a:xfrm>
+          <a:prstGeom prst="line">
+            <a:avLst/>
+          </a:prstGeom>
+          <a:ln w="12700"/>
+        </p:spPr>
+        <p:style>
+          <a:lnRef idx="1">
+            <a:schemeClr val="accent1"/>
+          </a:lnRef>
+          <a:fillRef idx="0">
+            <a:schemeClr val="accent1"/>
+          </a:fillRef>
+          <a:effectRef idx="0">
+            <a:schemeClr val="accent1"/>
+          </a:effectRef>
+          <a:fontRef idx="minor">
+            <a:schemeClr val="tx1"/>
+          </a:fontRef>
+        </p:style>
+      </p:cxnSp>
+      <p:sp>
+        <p:nvSpPr>
+          <p:cNvPr id="59" name="TextBox 58"/>
+          <p:cNvSpPr txBox="1"/>
+          <p:nvPr/>
+        </p:nvSpPr>
+        <p:spPr>
+          <a:xfrm>
+            <a:off x="8080979" y="1233863"/>
+            <a:ext cx="3691164" cy="1077218"/>
+          </a:xfrm>
+          <a:prstGeom prst="rect">
+            <a:avLst/>
+          </a:prstGeom>
+          <a:noFill/>
+          <a:ln w="12700">
+            <a:solidFill>
+              <a:schemeClr val="accent1"/>
+            </a:solidFill>
+          </a:ln>
+        </p:spPr>
+        <p:txBody>
+          <a:bodyPr wrap="square" rtlCol="0">
+            <a:spAutoFit/>
+          </a:bodyPr>
+          <a:lstStyle/>
+          <a:p>
+            <a:r>
+              <a:rPr lang="de-DE" sz="1600" b="1" dirty="0">
+                <a:solidFill>
+                  <a:schemeClr val="accent1"/>
+                </a:solidFill>
+              </a:rPr>
+              <a:t>Incoming traffic</a:t>
+            </a:r>
+            <a:r>
+              <a:rPr lang="de-DE" sz="1600" dirty="0">
+                <a:solidFill>
+                  <a:schemeClr val="accent1"/>
+                </a:solidFill>
+              </a:rPr>
+              <a:t>:</a:t>
+            </a:r>
+          </a:p>
+          <a:p>
+            <a:r>
+              <a:rPr lang="de-DE" sz="1600" dirty="0">
+                <a:solidFill>
+                  <a:schemeClr val="accent1"/>
+                </a:solidFill>
+              </a:rPr>
+              <a:t>External LB used for incoming traffic from the internet over LB rules (today port-specific, cannot collide with ILB rules)</a:t>
+            </a:r>
+            <a:endParaRPr lang="en-US" sz="1600" dirty="0">
+              <a:solidFill>
+                <a:schemeClr val="accent1"/>
+              </a:solidFill>
+            </a:endParaRPr>
+          </a:p>
+        </p:txBody>
+      </p:sp>
+      <p:cxnSp>
+        <p:nvCxnSpPr>
+          <p:cNvPr id="60" name="Straight Connector 59"/>
+          <p:cNvCxnSpPr>
+            <a:stCxn id="56" idx="3"/>
+            <a:endCxn id="59" idx="1"/>
+          </p:cNvCxnSpPr>
+          <p:nvPr/>
+        </p:nvCxnSpPr>
+        <p:spPr>
+          <a:xfrm flipV="1">
+            <a:off x="6174570" y="1772472"/>
+            <a:ext cx="1906409" cy="172624"/>
+          </a:xfrm>
+          <a:prstGeom prst="line">
+            <a:avLst/>
+          </a:prstGeom>
+          <a:ln w="12700"/>
+        </p:spPr>
+        <p:style>
+          <a:lnRef idx="1">
+            <a:schemeClr val="accent1"/>
+          </a:lnRef>
+          <a:fillRef idx="0">
+            <a:schemeClr val="accent1"/>
+          </a:fillRef>
+          <a:effectRef idx="0">
+            <a:schemeClr val="accent1"/>
+          </a:effectRef>
+          <a:fontRef idx="minor">
+            <a:schemeClr val="tx1"/>
+          </a:fontRef>
+        </p:style>
+      </p:cxnSp>
+      <p:sp>
+        <p:nvSpPr>
+          <p:cNvPr id="61" name="TextBox 60"/>
+          <p:cNvSpPr txBox="1"/>
+          <p:nvPr/>
+        </p:nvSpPr>
+        <p:spPr>
+          <a:xfrm>
+            <a:off x="240096" y="2784001"/>
+            <a:ext cx="2249892" cy="1569660"/>
+          </a:xfrm>
+          <a:prstGeom prst="rect">
+            <a:avLst/>
+          </a:prstGeom>
+          <a:noFill/>
+          <a:ln>
+            <a:solidFill>
+              <a:schemeClr val="accent1"/>
+            </a:solidFill>
+          </a:ln>
+        </p:spPr>
+        <p:txBody>
+          <a:bodyPr wrap="square" rtlCol="0">
+            <a:spAutoFit/>
+          </a:bodyPr>
+          <a:lstStyle/>
+          <a:p>
+            <a:r>
+              <a:rPr lang="de-DE" sz="1600" dirty="0">
+                <a:solidFill>
+                  <a:schemeClr val="accent1"/>
+                </a:solidFill>
+              </a:rPr>
+              <a:t>As a consequence, both LBs must be associated to the same NIC in the NVA. Today that can be done only using non-overlapping TCP ports.</a:t>
+            </a:r>
+            <a:endParaRPr lang="en-US" sz="1600" dirty="0">
+              <a:solidFill>
+                <a:schemeClr val="accent1"/>
+              </a:solidFill>
+            </a:endParaRPr>
+          </a:p>
+        </p:txBody>
+      </p:sp>
+      <p:grpSp>
+        <p:nvGrpSpPr>
+          <p:cNvPr id="62" name="Group 61"/>
+          <p:cNvGrpSpPr/>
+          <p:nvPr/>
+        </p:nvGrpSpPr>
+        <p:grpSpPr>
+          <a:xfrm>
+            <a:off x="3774394" y="5172745"/>
+            <a:ext cx="2011363" cy="304800"/>
+            <a:chOff x="1722437" y="4945062"/>
+            <a:chExt cx="4191000" cy="304800"/>
+          </a:xfrm>
+        </p:grpSpPr>
+        <p:cxnSp>
+          <p:nvCxnSpPr>
+            <p:cNvPr id="63" name="Straight Connector 62"/>
+            <p:cNvCxnSpPr/>
+            <p:nvPr/>
+          </p:nvCxnSpPr>
+          <p:spPr>
+            <a:xfrm>
+              <a:off x="1722437" y="5097462"/>
+              <a:ext cx="4191000" cy="0"/>
+            </a:xfrm>
+            <a:prstGeom prst="line">
+              <a:avLst/>
+            </a:prstGeom>
+            <a:ln>
+              <a:solidFill>
+                <a:schemeClr val="tx1"/>
+              </a:solidFill>
+              <a:headEnd type="none"/>
+              <a:tailEnd type="none"/>
+            </a:ln>
+          </p:spPr>
+          <p:style>
+            <a:lnRef idx="1">
+              <a:schemeClr val="accent1"/>
+            </a:lnRef>
+            <a:fillRef idx="0">
+              <a:schemeClr val="accent1"/>
+            </a:fillRef>
+            <a:effectRef idx="0">
+              <a:schemeClr val="accent1"/>
+            </a:effectRef>
+            <a:fontRef idx="minor">
+              <a:schemeClr val="tx1"/>
+            </a:fontRef>
+          </p:style>
+        </p:cxnSp>
+        <p:cxnSp>
+          <p:nvCxnSpPr>
+            <p:cNvPr id="64" name="Straight Connector 63"/>
+            <p:cNvCxnSpPr/>
+            <p:nvPr/>
+          </p:nvCxnSpPr>
+          <p:spPr>
+            <a:xfrm flipV="1">
+              <a:off x="1722437" y="4945062"/>
+              <a:ext cx="0" cy="304800"/>
+            </a:xfrm>
+            <a:prstGeom prst="line">
+              <a:avLst/>
+            </a:prstGeom>
+            <a:ln>
+              <a:solidFill>
+                <a:schemeClr val="tx1"/>
+              </a:solidFill>
+              <a:headEnd type="none"/>
+              <a:tailEnd type="none"/>
+            </a:ln>
+          </p:spPr>
+          <p:style>
+            <a:lnRef idx="1">
+              <a:schemeClr val="accent1"/>
+            </a:lnRef>
+            <a:fillRef idx="0">
+              <a:schemeClr val="accent1"/>
+            </a:fillRef>
+            <a:effectRef idx="0">
+              <a:schemeClr val="accent1"/>
+            </a:effectRef>
+            <a:fontRef idx="minor">
+              <a:schemeClr val="tx1"/>
+            </a:fontRef>
+          </p:style>
+        </p:cxnSp>
+        <p:cxnSp>
+          <p:nvCxnSpPr>
+            <p:cNvPr id="65" name="Straight Connector 64"/>
+            <p:cNvCxnSpPr/>
+            <p:nvPr/>
+          </p:nvCxnSpPr>
+          <p:spPr>
+            <a:xfrm flipV="1">
+              <a:off x="5913437" y="4945062"/>
+              <a:ext cx="0" cy="304800"/>
+            </a:xfrm>
+            <a:prstGeom prst="line">
+              <a:avLst/>
+            </a:prstGeom>
+            <a:ln>
+              <a:solidFill>
+                <a:schemeClr val="tx1"/>
+              </a:solidFill>
+              <a:headEnd type="none"/>
+              <a:tailEnd type="none"/>
+            </a:ln>
+          </p:spPr>
+          <p:style>
+            <a:lnRef idx="1">
+              <a:schemeClr val="accent1"/>
+            </a:lnRef>
+            <a:fillRef idx="0">
+              <a:schemeClr val="accent1"/>
+            </a:fillRef>
+            <a:effectRef idx="0">
+              <a:schemeClr val="accent1"/>
+            </a:effectRef>
+            <a:fontRef idx="minor">
+              <a:schemeClr val="tx1"/>
+            </a:fontRef>
+          </p:style>
+        </p:cxnSp>
+      </p:grpSp>
+      <p:sp>
+        <p:nvSpPr>
+          <p:cNvPr id="66" name="TextBox 65"/>
+          <p:cNvSpPr txBox="1"/>
+          <p:nvPr/>
+        </p:nvSpPr>
+        <p:spPr>
+          <a:xfrm>
+            <a:off x="4064622" y="5178917"/>
+            <a:ext cx="1212511" cy="489365"/>
+          </a:xfrm>
+          <a:prstGeom prst="rect">
+            <a:avLst/>
+          </a:prstGeom>
+          <a:noFill/>
+        </p:spPr>
+        <p:txBody>
+          <a:bodyPr wrap="none" lIns="182880" tIns="146304" rIns="182880" bIns="146304" rtlCol="0">
+            <a:spAutoFit/>
+          </a:bodyPr>
+          <a:lstStyle/>
+          <a:p>
+            <a:pPr>
+              <a:lnSpc>
+                <a:spcPct val="90000"/>
+              </a:lnSpc>
+              <a:spcAft>
+                <a:spcPts val="600"/>
+              </a:spcAft>
+            </a:pPr>
+            <a:r>
+              <a:rPr lang="en-US" sz="1400" dirty="0">
+                <a:solidFill>
+                  <a:schemeClr val="tx1">
+                    <a:lumMod val="65000"/>
+                    <a:lumOff val="35000"/>
+                  </a:schemeClr>
+                </a:solidFill>
+              </a:rPr>
+              <a:t>10.1.1.0/24</a:t>
+            </a:r>
+          </a:p>
+        </p:txBody>
+      </p:sp>
+      <p:sp>
+        <p:nvSpPr>
+          <p:cNvPr id="67" name="TextBox 66"/>
+          <p:cNvSpPr txBox="1"/>
+          <p:nvPr/>
+        </p:nvSpPr>
+        <p:spPr>
+          <a:xfrm>
+            <a:off x="3941272" y="5019653"/>
+            <a:ext cx="340158" cy="338554"/>
+          </a:xfrm>
+          <a:prstGeom prst="rect">
+            <a:avLst/>
+          </a:prstGeom>
+          <a:noFill/>
+        </p:spPr>
+        <p:txBody>
+          <a:bodyPr wrap="none" rtlCol="0">
+            <a:spAutoFit/>
+          </a:bodyPr>
+          <a:lstStyle/>
+          <a:p>
+            <a:r>
+              <a:rPr lang="de-DE" sz="1600" dirty="0">
+                <a:solidFill>
+                  <a:schemeClr val="tx1">
+                    <a:lumMod val="65000"/>
+                    <a:lumOff val="35000"/>
+                  </a:schemeClr>
+                </a:solidFill>
+              </a:rPr>
+              <a:t>.4</a:t>
+            </a:r>
+          </a:p>
+        </p:txBody>
+      </p:sp>
+      <p:grpSp>
+        <p:nvGrpSpPr>
+          <p:cNvPr id="68" name="Group 67"/>
+          <p:cNvGrpSpPr/>
+          <p:nvPr/>
+        </p:nvGrpSpPr>
+        <p:grpSpPr>
+          <a:xfrm>
+            <a:off x="6539365" y="5166573"/>
+            <a:ext cx="2011363" cy="304800"/>
+            <a:chOff x="1722437" y="4945062"/>
+            <a:chExt cx="4191000" cy="304800"/>
+          </a:xfrm>
+        </p:grpSpPr>
+        <p:cxnSp>
+          <p:nvCxnSpPr>
+            <p:cNvPr id="69" name="Straight Connector 68"/>
+            <p:cNvCxnSpPr/>
+            <p:nvPr/>
+          </p:nvCxnSpPr>
+          <p:spPr>
+            <a:xfrm>
+              <a:off x="1722437" y="5097462"/>
+              <a:ext cx="4191000" cy="0"/>
+            </a:xfrm>
+            <a:prstGeom prst="line">
+              <a:avLst/>
+            </a:prstGeom>
+            <a:ln>
+              <a:solidFill>
+                <a:schemeClr val="tx1"/>
+              </a:solidFill>
+              <a:headEnd type="none"/>
+              <a:tailEnd type="none"/>
+            </a:ln>
+          </p:spPr>
+          <p:style>
+            <a:lnRef idx="1">
+              <a:schemeClr val="accent1"/>
+            </a:lnRef>
+            <a:fillRef idx="0">
+              <a:schemeClr val="accent1"/>
+            </a:fillRef>
+            <a:effectRef idx="0">
+              <a:schemeClr val="accent1"/>
+            </a:effectRef>
+            <a:fontRef idx="minor">
+              <a:schemeClr val="tx1"/>
+            </a:fontRef>
+          </p:style>
+        </p:cxnSp>
+        <p:cxnSp>
+          <p:nvCxnSpPr>
+            <p:cNvPr id="70" name="Straight Connector 69"/>
+            <p:cNvCxnSpPr/>
+            <p:nvPr/>
+          </p:nvCxnSpPr>
+          <p:spPr>
+            <a:xfrm flipV="1">
+              <a:off x="1722437" y="4945062"/>
+              <a:ext cx="0" cy="304800"/>
+            </a:xfrm>
+            <a:prstGeom prst="line">
+              <a:avLst/>
+            </a:prstGeom>
+            <a:ln>
+              <a:solidFill>
+                <a:schemeClr val="tx1"/>
+              </a:solidFill>
+              <a:headEnd type="none"/>
+              <a:tailEnd type="none"/>
+            </a:ln>
+          </p:spPr>
+          <p:style>
+            <a:lnRef idx="1">
+              <a:schemeClr val="accent1"/>
+            </a:lnRef>
+            <a:fillRef idx="0">
+              <a:schemeClr val="accent1"/>
+            </a:fillRef>
+            <a:effectRef idx="0">
+              <a:schemeClr val="accent1"/>
+            </a:effectRef>
+            <a:fontRef idx="minor">
+              <a:schemeClr val="tx1"/>
+            </a:fontRef>
+          </p:style>
+        </p:cxnSp>
+        <p:cxnSp>
+          <p:nvCxnSpPr>
+            <p:cNvPr id="71" name="Straight Connector 70"/>
+            <p:cNvCxnSpPr/>
+            <p:nvPr/>
+          </p:nvCxnSpPr>
+          <p:spPr>
+            <a:xfrm flipV="1">
+              <a:off x="5913437" y="4945062"/>
+              <a:ext cx="0" cy="304800"/>
+            </a:xfrm>
+            <a:prstGeom prst="line">
+              <a:avLst/>
+            </a:prstGeom>
+            <a:ln>
+              <a:solidFill>
+                <a:schemeClr val="tx1"/>
+              </a:solidFill>
+              <a:headEnd type="none"/>
+              <a:tailEnd type="none"/>
+            </a:ln>
+          </p:spPr>
+          <p:style>
+            <a:lnRef idx="1">
+              <a:schemeClr val="accent1"/>
+            </a:lnRef>
+            <a:fillRef idx="0">
+              <a:schemeClr val="accent1"/>
+            </a:fillRef>
+            <a:effectRef idx="0">
+              <a:schemeClr val="accent1"/>
+            </a:effectRef>
+            <a:fontRef idx="minor">
+              <a:schemeClr val="tx1"/>
+            </a:fontRef>
+          </p:style>
+        </p:cxnSp>
+      </p:grpSp>
+      <p:sp>
+        <p:nvSpPr>
+          <p:cNvPr id="72" name="TextBox 71"/>
+          <p:cNvSpPr txBox="1"/>
+          <p:nvPr/>
+        </p:nvSpPr>
+        <p:spPr>
+          <a:xfrm>
+            <a:off x="6829593" y="5172745"/>
+            <a:ext cx="1212511" cy="489365"/>
+          </a:xfrm>
+          <a:prstGeom prst="rect">
+            <a:avLst/>
+          </a:prstGeom>
+          <a:noFill/>
+        </p:spPr>
+        <p:txBody>
+          <a:bodyPr wrap="none" lIns="182880" tIns="146304" rIns="182880" bIns="146304" rtlCol="0">
+            <a:spAutoFit/>
+          </a:bodyPr>
+          <a:lstStyle/>
+          <a:p>
+            <a:pPr>
+              <a:lnSpc>
+                <a:spcPct val="90000"/>
+              </a:lnSpc>
+              <a:spcAft>
+                <a:spcPts val="600"/>
+              </a:spcAft>
+            </a:pPr>
+            <a:r>
+              <a:rPr lang="en-US" sz="1400" dirty="0">
+                <a:solidFill>
+                  <a:schemeClr val="tx1">
+                    <a:lumMod val="65000"/>
+                    <a:lumOff val="35000"/>
+                  </a:schemeClr>
+                </a:solidFill>
+              </a:rPr>
+              <a:t>10.2.1.0/24</a:t>
+            </a:r>
+          </a:p>
+        </p:txBody>
+      </p:sp>
+      <p:sp>
+        <p:nvSpPr>
+          <p:cNvPr id="73" name="TextBox 72"/>
+          <p:cNvSpPr txBox="1"/>
+          <p:nvPr/>
+        </p:nvSpPr>
+        <p:spPr>
+          <a:xfrm>
+            <a:off x="6706243" y="5013481"/>
+            <a:ext cx="340158" cy="338554"/>
+          </a:xfrm>
+          <a:prstGeom prst="rect">
+            <a:avLst/>
+          </a:prstGeom>
+          <a:noFill/>
+        </p:spPr>
+        <p:txBody>
+          <a:bodyPr wrap="none" rtlCol="0">
+            <a:spAutoFit/>
+          </a:bodyPr>
+          <a:lstStyle/>
+          <a:p>
+            <a:r>
+              <a:rPr lang="de-DE" sz="1600" dirty="0">
+                <a:solidFill>
+                  <a:schemeClr val="tx1">
+                    <a:lumMod val="65000"/>
+                    <a:lumOff val="35000"/>
+                  </a:schemeClr>
+                </a:solidFill>
+              </a:rPr>
+              <a:t>.4</a:t>
+            </a:r>
+          </a:p>
+        </p:txBody>
+      </p:sp>
+      <p:cxnSp>
+        <p:nvCxnSpPr>
+          <p:cNvPr id="74" name="Straight Connector 73"/>
+          <p:cNvCxnSpPr/>
+          <p:nvPr/>
+        </p:nvCxnSpPr>
+        <p:spPr>
+          <a:xfrm flipH="1">
+            <a:off x="3985547" y="4715866"/>
+            <a:ext cx="4158" cy="595230"/>
+          </a:xfrm>
+          <a:prstGeom prst="line">
+            <a:avLst/>
+          </a:prstGeom>
+          <a:ln>
+            <a:solidFill>
+              <a:schemeClr val="tx1"/>
+            </a:solidFill>
+            <a:headEnd type="none"/>
+            <a:tailEnd type="none"/>
+          </a:ln>
+        </p:spPr>
+        <p:style>
+          <a:lnRef idx="1">
+            <a:schemeClr val="accent1"/>
+          </a:lnRef>
+          <a:fillRef idx="0">
+            <a:schemeClr val="accent1"/>
+          </a:fillRef>
+          <a:effectRef idx="0">
+            <a:schemeClr val="accent1"/>
+          </a:effectRef>
+          <a:fontRef idx="minor">
+            <a:schemeClr val="tx1"/>
+          </a:fontRef>
+        </p:style>
+      </p:cxnSp>
+      <p:cxnSp>
+        <p:nvCxnSpPr>
+          <p:cNvPr id="75" name="Straight Connector 74"/>
+          <p:cNvCxnSpPr/>
+          <p:nvPr/>
+        </p:nvCxnSpPr>
+        <p:spPr>
+          <a:xfrm flipH="1">
+            <a:off x="6739918" y="4706253"/>
+            <a:ext cx="4158" cy="595230"/>
+          </a:xfrm>
+          <a:prstGeom prst="line">
+            <a:avLst/>
+          </a:prstGeom>
+          <a:ln>
+            <a:solidFill>
+              <a:schemeClr val="tx1"/>
+            </a:solidFill>
+            <a:headEnd type="none"/>
+            <a:tailEnd type="none"/>
+          </a:ln>
+        </p:spPr>
+        <p:style>
+          <a:lnRef idx="1">
+            <a:schemeClr val="accent1"/>
+          </a:lnRef>
+          <a:fillRef idx="0">
+            <a:schemeClr val="accent1"/>
+          </a:fillRef>
+          <a:effectRef idx="0">
+            <a:schemeClr val="accent1"/>
+          </a:effectRef>
+          <a:fontRef idx="minor">
+            <a:schemeClr val="tx1"/>
+          </a:fontRef>
+        </p:style>
+      </p:cxnSp>
+      <p:pic>
+        <p:nvPicPr>
+          <p:cNvPr id="9" name="Picture 2" descr="http://design.ubuntu.com/wp-content/uploads/ubuntu-logo112.png"/>
+          <p:cNvPicPr>
+            <a:picLocks noChangeAspect="1" noChangeArrowheads="1"/>
+          </p:cNvPicPr>
+          <p:nvPr/>
+        </p:nvPicPr>
+        <p:blipFill rotWithShape="1">
+          <a:blip r:embed="rId2">
+            <a:clrChange>
+              <a:clrFrom>
+                <a:srgbClr val="FFFFFF"/>
+              </a:clrFrom>
+              <a:clrTo>
+                <a:srgbClr val="FFFFFF">
+                  <a:alpha val="0"/>
+                </a:srgbClr>
+              </a:clrTo>
+            </a:clrChange>
+            <a:extLst>
+              <a:ext uri="{28A0092B-C50C-407E-A947-70E740481C1C}">
+                <a14:useLocalDpi xmlns:a14="http://schemas.microsoft.com/office/drawing/2010/main" val="0"/>
+              </a:ext>
+            </a:extLst>
+          </a:blip>
+          <a:srcRect l="20695" r="23109" b="32515"/>
+          <a:stretch/>
+        </p:blipFill>
+        <p:spPr bwMode="auto">
+          <a:xfrm>
+            <a:off x="3666434" y="4440243"/>
+            <a:ext cx="656161" cy="627751"/>
+          </a:xfrm>
+          <a:prstGeom prst="rect">
+            <a:avLst/>
+          </a:prstGeom>
+          <a:noFill/>
+          <a:extLst>
+            <a:ext uri="{909E8E84-426E-40DD-AFC4-6F175D3DCCD1}">
+              <a14:hiddenFill xmlns:a14="http://schemas.microsoft.com/office/drawing/2010/main">
+                <a:solidFill>
+                  <a:srgbClr val="FFFFFF"/>
+                </a:solidFill>
+              </a14:hiddenFill>
+            </a:ext>
+          </a:extLst>
+        </p:spPr>
+      </p:pic>
+      <p:pic>
+        <p:nvPicPr>
+          <p:cNvPr id="31" name="Picture 2" descr="http://design.ubuntu.com/wp-content/uploads/ubuntu-logo112.png"/>
+          <p:cNvPicPr>
+            <a:picLocks noChangeAspect="1" noChangeArrowheads="1"/>
+          </p:cNvPicPr>
+          <p:nvPr/>
+        </p:nvPicPr>
+        <p:blipFill rotWithShape="1">
+          <a:blip r:embed="rId2">
+            <a:clrChange>
+              <a:clrFrom>
+                <a:srgbClr val="FFFFFF"/>
+              </a:clrFrom>
+              <a:clrTo>
+                <a:srgbClr val="FFFFFF">
+                  <a:alpha val="0"/>
+                </a:srgbClr>
+              </a:clrTo>
+            </a:clrChange>
+            <a:extLst>
+              <a:ext uri="{28A0092B-C50C-407E-A947-70E740481C1C}">
+                <a14:useLocalDpi xmlns:a14="http://schemas.microsoft.com/office/drawing/2010/main" val="0"/>
+              </a:ext>
+            </a:extLst>
+          </a:blip>
+          <a:srcRect l="20695" r="23109" b="32515"/>
+          <a:stretch/>
+        </p:blipFill>
+        <p:spPr bwMode="auto">
+          <a:xfrm>
+            <a:off x="6431405" y="4434071"/>
+            <a:ext cx="656161" cy="627751"/>
+          </a:xfrm>
+          <a:prstGeom prst="rect">
+            <a:avLst/>
+          </a:prstGeom>
+          <a:noFill/>
+          <a:extLst>
+            <a:ext uri="{909E8E84-426E-40DD-AFC4-6F175D3DCCD1}">
+              <a14:hiddenFill xmlns:a14="http://schemas.microsoft.com/office/drawing/2010/main">
+                <a:solidFill>
+                  <a:srgbClr val="FFFFFF"/>
+                </a:solidFill>
+              </a14:hiddenFill>
+            </a:ext>
+          </a:extLst>
+        </p:spPr>
+      </p:pic>
+      <p:sp>
+        <p:nvSpPr>
+          <p:cNvPr id="76" name="TextBox 75"/>
+          <p:cNvSpPr txBox="1"/>
+          <p:nvPr/>
+        </p:nvSpPr>
+        <p:spPr>
+          <a:xfrm>
+            <a:off x="6485626" y="5572571"/>
+            <a:ext cx="5228034" cy="1077218"/>
+          </a:xfrm>
+          <a:prstGeom prst="rect">
+            <a:avLst/>
+          </a:prstGeom>
+          <a:noFill/>
+          <a:ln>
+            <a:solidFill>
+              <a:schemeClr val="accent1"/>
+            </a:solidFill>
+          </a:ln>
+        </p:spPr>
+        <p:txBody>
+          <a:bodyPr wrap="none" rtlCol="0">
+            <a:spAutoFit/>
+          </a:bodyPr>
+          <a:lstStyle/>
+          <a:p>
+            <a:r>
+              <a:rPr lang="de-DE" sz="1600" b="1" dirty="0">
+                <a:solidFill>
+                  <a:schemeClr val="accent1"/>
+                </a:solidFill>
+              </a:rPr>
+              <a:t>UDR in vnet2-subnet1</a:t>
+            </a:r>
+            <a:r>
+              <a:rPr lang="de-DE" sz="1600" dirty="0">
+                <a:solidFill>
+                  <a:schemeClr val="accent1"/>
+                </a:solidFill>
+              </a:rPr>
+              <a:t>:</a:t>
+            </a:r>
+          </a:p>
+          <a:p>
+            <a:r>
+              <a:rPr lang="de-DE" sz="1600" dirty="0">
+                <a:solidFill>
+                  <a:schemeClr val="accent1"/>
+                </a:solidFill>
+              </a:rPr>
+              <a:t>10.2.1.0/24 -&gt; 10.4.2.100 (for intra-subnet traffic filtering)</a:t>
+            </a:r>
+          </a:p>
+          <a:p>
+            <a:r>
+              <a:rPr lang="de-DE" sz="1600" dirty="0">
+                <a:solidFill>
+                  <a:schemeClr val="accent1"/>
+                </a:solidFill>
+              </a:rPr>
+              <a:t>10.1.0.0/16 -&gt; 10.4.2.100 (for inter-vnet traffic filtering)</a:t>
+            </a:r>
+          </a:p>
+          <a:p>
+            <a:r>
+              <a:rPr lang="de-DE" sz="1600" dirty="0">
+                <a:solidFill>
+                  <a:schemeClr val="accent1"/>
+                </a:solidFill>
+              </a:rPr>
+              <a:t>0.0.0.0/0 -&gt; 10.4.2.100 (for Internet outgoing traffic filtering)</a:t>
+            </a:r>
+            <a:endParaRPr lang="en-US" sz="1600" dirty="0">
+              <a:solidFill>
+                <a:schemeClr val="accent1"/>
+              </a:solidFill>
+            </a:endParaRPr>
+          </a:p>
+        </p:txBody>
+      </p:sp>
+    </p:spTree>
+    <p:extLst>
+      <p:ext uri="{BB962C8B-B14F-4D97-AF65-F5344CB8AC3E}">
+        <p14:creationId xmlns:p14="http://schemas.microsoft.com/office/powerpoint/2010/main" val="3935375027"/>
+      </p:ext>
+    </p:extLst>
+  </p:cSld>
+  <p:clrMapOvr>
+    <a:masterClrMapping/>
+  </p:clrMapOvr>
+</p:sld>
+</file>
+
+<file path=ppt/slides/slide12.xml><?xml version="1.0" encoding="utf-8"?>
+<p:sld xmlns:a="http://schemas.openxmlformats.org/drawingml/2006/main" xmlns:r="http://schemas.openxmlformats.org/officeDocument/2006/relationships" xmlns:p="http://schemas.openxmlformats.org/presentationml/2006/main">
+  <p:cSld>
+    <p:spTree>
+      <p:nvGrpSpPr>
+        <p:cNvPr id="1" name=""/>
+        <p:cNvGrpSpPr/>
+        <p:nvPr/>
+      </p:nvGrpSpPr>
+      <p:grpSpPr>
+        <a:xfrm>
+          <a:off x="0" y="0"/>
+          <a:ext cx="0" cy="0"/>
+          <a:chOff x="0" y="0"/>
+          <a:chExt cx="0" cy="0"/>
+        </a:xfrm>
+      </p:grpSpPr>
+      <p:sp>
+        <p:nvSpPr>
+          <p:cNvPr id="11" name="Rectangle 10"/>
+          <p:cNvSpPr/>
+          <p:nvPr/>
+        </p:nvSpPr>
+        <p:spPr>
+          <a:xfrm>
+            <a:off x="3182593" y="2704694"/>
+            <a:ext cx="1252829" cy="1159924"/>
+          </a:xfrm>
+          <a:prstGeom prst="rect">
+            <a:avLst/>
+          </a:prstGeom>
+          <a:solidFill>
+            <a:schemeClr val="accent6">
+              <a:lumMod val="20000"/>
+              <a:lumOff val="80000"/>
+            </a:schemeClr>
+          </a:solidFill>
+          <a:ln>
+            <a:solidFill>
+              <a:schemeClr val="accent6">
+                <a:lumMod val="75000"/>
+              </a:schemeClr>
+            </a:solidFill>
+          </a:ln>
+        </p:spPr>
+        <p:style>
+          <a:lnRef idx="2">
+            <a:schemeClr val="accent1">
+              <a:shade val="50000"/>
+            </a:schemeClr>
+          </a:lnRef>
+          <a:fillRef idx="1">
+            <a:schemeClr val="accent1"/>
+          </a:fillRef>
+          <a:effectRef idx="0">
+            <a:schemeClr val="accent1"/>
+          </a:effectRef>
+          <a:fontRef idx="minor">
+            <a:schemeClr val="lt1"/>
+          </a:fontRef>
+        </p:style>
+        <p:txBody>
+          <a:bodyPr rtlCol="0" anchor="ctr"/>
+          <a:lstStyle/>
+          <a:p>
+            <a:pPr algn="ctr"/>
+            <a:endParaRPr lang="en-US"/>
+          </a:p>
+        </p:txBody>
+      </p:sp>
+      <p:sp>
+        <p:nvSpPr>
+          <p:cNvPr id="46" name="Arrow: Curved Right 45"/>
+          <p:cNvSpPr/>
+          <p:nvPr/>
+        </p:nvSpPr>
+        <p:spPr>
+          <a:xfrm rot="16200000" flipH="1">
+            <a:off x="4691155" y="2915017"/>
+            <a:ext cx="1507000" cy="3258799"/>
+          </a:xfrm>
+          <a:prstGeom prst="curvedRightArrow">
+            <a:avLst/>
+          </a:prstGeom>
+          <a:solidFill>
+            <a:schemeClr val="accent1">
+              <a:lumMod val="20000"/>
+              <a:lumOff val="80000"/>
+            </a:schemeClr>
+          </a:solidFill>
+        </p:spPr>
+        <p:style>
+          <a:lnRef idx="2">
+            <a:schemeClr val="accent1">
+              <a:shade val="50000"/>
+            </a:schemeClr>
+          </a:lnRef>
+          <a:fillRef idx="1">
+            <a:schemeClr val="accent1"/>
+          </a:fillRef>
+          <a:effectRef idx="0">
+            <a:schemeClr val="accent1"/>
+          </a:effectRef>
+          <a:fontRef idx="minor">
+            <a:schemeClr val="lt1"/>
+          </a:fontRef>
+        </p:style>
+        <p:txBody>
+          <a:bodyPr rtlCol="0" anchor="ctr"/>
+          <a:lstStyle/>
+          <a:p>
+            <a:pPr algn="ctr"/>
+            <a:endParaRPr lang="en-US">
+              <a:solidFill>
+                <a:schemeClr val="tx1"/>
+              </a:solidFill>
+            </a:endParaRPr>
+          </a:p>
+        </p:txBody>
+      </p:sp>
+      <p:sp>
+        <p:nvSpPr>
+          <p:cNvPr id="2" name="Title 1"/>
+          <p:cNvSpPr>
+            <a:spLocks noGrp="1"/>
+          </p:cNvSpPr>
+          <p:nvPr>
+            <p:ph type="title"/>
+          </p:nvPr>
+        </p:nvSpPr>
+        <p:spPr>
+          <a:xfrm>
+            <a:off x="861468" y="27595"/>
+            <a:ext cx="6511119" cy="1325563"/>
+          </a:xfrm>
+        </p:spPr>
+        <p:txBody>
+          <a:bodyPr/>
+          <a:lstStyle/>
+          <a:p>
+            <a:r>
+              <a:rPr lang="de-DE" dirty="0"/>
+              <a:t>NVA VM Scale Set: problem</a:t>
+            </a:r>
+            <a:endParaRPr lang="en-US" dirty="0"/>
+          </a:p>
+        </p:txBody>
+      </p:sp>
+      <p:grpSp>
+        <p:nvGrpSpPr>
+          <p:cNvPr id="33" name="Group 32"/>
+          <p:cNvGrpSpPr/>
+          <p:nvPr/>
+        </p:nvGrpSpPr>
+        <p:grpSpPr>
+          <a:xfrm>
+            <a:off x="3666434" y="4398908"/>
+            <a:ext cx="3487633" cy="242161"/>
+            <a:chOff x="1722437" y="4945062"/>
+            <a:chExt cx="4191000" cy="304800"/>
+          </a:xfrm>
+        </p:grpSpPr>
+        <p:cxnSp>
+          <p:nvCxnSpPr>
+            <p:cNvPr id="34" name="Straight Connector 33"/>
+            <p:cNvCxnSpPr/>
+            <p:nvPr/>
+          </p:nvCxnSpPr>
+          <p:spPr>
+            <a:xfrm>
+              <a:off x="1722437" y="5097462"/>
+              <a:ext cx="4191000" cy="0"/>
+            </a:xfrm>
+            <a:prstGeom prst="line">
+              <a:avLst/>
+            </a:prstGeom>
+            <a:ln>
+              <a:solidFill>
+                <a:schemeClr val="tx1"/>
+              </a:solidFill>
+              <a:headEnd type="none"/>
+              <a:tailEnd type="none"/>
+            </a:ln>
+          </p:spPr>
+          <p:style>
+            <a:lnRef idx="1">
+              <a:schemeClr val="accent1"/>
+            </a:lnRef>
+            <a:fillRef idx="0">
+              <a:schemeClr val="accent1"/>
+            </a:fillRef>
+            <a:effectRef idx="0">
+              <a:schemeClr val="accent1"/>
+            </a:effectRef>
+            <a:fontRef idx="minor">
+              <a:schemeClr val="tx1"/>
+            </a:fontRef>
+          </p:style>
+        </p:cxnSp>
+        <p:cxnSp>
+          <p:nvCxnSpPr>
+            <p:cNvPr id="35" name="Straight Connector 34"/>
+            <p:cNvCxnSpPr/>
+            <p:nvPr/>
+          </p:nvCxnSpPr>
+          <p:spPr>
+            <a:xfrm flipV="1">
+              <a:off x="1722437" y="4945062"/>
+              <a:ext cx="0" cy="304800"/>
+            </a:xfrm>
+            <a:prstGeom prst="line">
+              <a:avLst/>
+            </a:prstGeom>
+            <a:ln>
+              <a:solidFill>
+                <a:schemeClr val="tx1"/>
+              </a:solidFill>
+              <a:headEnd type="none"/>
+              <a:tailEnd type="none"/>
+            </a:ln>
+          </p:spPr>
+          <p:style>
+            <a:lnRef idx="1">
+              <a:schemeClr val="accent1"/>
+            </a:lnRef>
+            <a:fillRef idx="0">
+              <a:schemeClr val="accent1"/>
+            </a:fillRef>
+            <a:effectRef idx="0">
+              <a:schemeClr val="accent1"/>
+            </a:effectRef>
+            <a:fontRef idx="minor">
+              <a:schemeClr val="tx1"/>
+            </a:fontRef>
+          </p:style>
+        </p:cxnSp>
+        <p:cxnSp>
+          <p:nvCxnSpPr>
+            <p:cNvPr id="36" name="Straight Connector 35"/>
+            <p:cNvCxnSpPr/>
+            <p:nvPr/>
+          </p:nvCxnSpPr>
+          <p:spPr>
+            <a:xfrm flipV="1">
+              <a:off x="5913437" y="4945062"/>
+              <a:ext cx="0" cy="304800"/>
+            </a:xfrm>
+            <a:prstGeom prst="line">
+              <a:avLst/>
+            </a:prstGeom>
+            <a:ln>
+              <a:solidFill>
+                <a:schemeClr val="tx1"/>
+              </a:solidFill>
+              <a:headEnd type="none"/>
+              <a:tailEnd type="none"/>
+            </a:ln>
+          </p:spPr>
+          <p:style>
+            <a:lnRef idx="1">
+              <a:schemeClr val="accent1"/>
+            </a:lnRef>
+            <a:fillRef idx="0">
+              <a:schemeClr val="accent1"/>
+            </a:fillRef>
+            <a:effectRef idx="0">
+              <a:schemeClr val="accent1"/>
+            </a:effectRef>
+            <a:fontRef idx="minor">
+              <a:schemeClr val="tx1"/>
+            </a:fontRef>
+          </p:style>
+        </p:cxnSp>
+      </p:grpSp>
+      <p:sp>
+        <p:nvSpPr>
+          <p:cNvPr id="37" name="TextBox 36"/>
+          <p:cNvSpPr txBox="1"/>
+          <p:nvPr/>
+        </p:nvSpPr>
+        <p:spPr>
+          <a:xfrm>
+            <a:off x="5255132" y="4379680"/>
+            <a:ext cx="1212511" cy="489365"/>
+          </a:xfrm>
+          <a:prstGeom prst="rect">
+            <a:avLst/>
+          </a:prstGeom>
+          <a:noFill/>
+        </p:spPr>
+        <p:txBody>
+          <a:bodyPr wrap="none" lIns="182880" tIns="146304" rIns="182880" bIns="146304" rtlCol="0">
+            <a:spAutoFit/>
+          </a:bodyPr>
+          <a:lstStyle/>
+          <a:p>
+            <a:pPr>
+              <a:lnSpc>
+                <a:spcPct val="90000"/>
+              </a:lnSpc>
+              <a:spcAft>
+                <a:spcPts val="600"/>
+              </a:spcAft>
+            </a:pPr>
+            <a:r>
+              <a:rPr lang="en-US" sz="1400" dirty="0">
+                <a:solidFill>
+                  <a:schemeClr val="tx1">
+                    <a:lumMod val="65000"/>
+                    <a:lumOff val="35000"/>
+                  </a:schemeClr>
+                </a:solidFill>
+              </a:rPr>
+              <a:t>10.4.2.0/24</a:t>
+            </a:r>
+          </a:p>
+        </p:txBody>
+      </p:sp>
+      <p:cxnSp>
+        <p:nvCxnSpPr>
+          <p:cNvPr id="38" name="Straight Connector 37"/>
+          <p:cNvCxnSpPr/>
+          <p:nvPr/>
+        </p:nvCxnSpPr>
+        <p:spPr>
+          <a:xfrm flipH="1">
+            <a:off x="3875286" y="3924860"/>
+            <a:ext cx="4158" cy="595230"/>
+          </a:xfrm>
+          <a:prstGeom prst="line">
+            <a:avLst/>
+          </a:prstGeom>
+          <a:ln>
+            <a:solidFill>
+              <a:schemeClr val="tx1"/>
+            </a:solidFill>
+            <a:headEnd type="none"/>
+            <a:tailEnd type="none"/>
+          </a:ln>
+        </p:spPr>
+        <p:style>
+          <a:lnRef idx="1">
+            <a:schemeClr val="accent1"/>
+          </a:lnRef>
+          <a:fillRef idx="0">
+            <a:schemeClr val="accent1"/>
+          </a:fillRef>
+          <a:effectRef idx="0">
+            <a:schemeClr val="accent1"/>
+          </a:effectRef>
+          <a:fontRef idx="minor">
+            <a:schemeClr val="tx1"/>
+          </a:fontRef>
+        </p:style>
+      </p:cxnSp>
+      <p:pic>
+        <p:nvPicPr>
+          <p:cNvPr id="39" name="Picture 2" descr="http://design.ubuntu.com/wp-content/uploads/ubuntu-logo112.png"/>
+          <p:cNvPicPr>
+            <a:picLocks noChangeAspect="1" noChangeArrowheads="1"/>
+          </p:cNvPicPr>
+          <p:nvPr/>
+        </p:nvPicPr>
+        <p:blipFill rotWithShape="1">
+          <a:blip r:embed="rId2">
+            <a:clrChange>
+              <a:clrFrom>
+                <a:srgbClr val="FFFFFF"/>
+              </a:clrFrom>
+              <a:clrTo>
+                <a:srgbClr val="FFFFFF">
+                  <a:alpha val="0"/>
+                </a:srgbClr>
+              </a:clrTo>
+            </a:clrChange>
+            <a:duotone>
+              <a:schemeClr val="accent6">
+                <a:shade val="45000"/>
+                <a:satMod val="135000"/>
+              </a:schemeClr>
+              <a:prstClr val="white"/>
+            </a:duotone>
+            <a:extLst>
+              <a:ext uri="{28A0092B-C50C-407E-A947-70E740481C1C}">
+                <a14:useLocalDpi xmlns:a14="http://schemas.microsoft.com/office/drawing/2010/main" val="0"/>
+              </a:ext>
+            </a:extLst>
+          </a:blip>
+          <a:srcRect l="20695" r="23109" b="32515"/>
+          <a:stretch/>
+        </p:blipFill>
+        <p:spPr bwMode="auto">
+          <a:xfrm>
+            <a:off x="3323990" y="2900507"/>
+            <a:ext cx="656161" cy="627751"/>
+          </a:xfrm>
+          <a:prstGeom prst="rect">
+            <a:avLst/>
+          </a:prstGeom>
+          <a:noFill/>
+          <a:extLst>
+            <a:ext uri="{909E8E84-426E-40DD-AFC4-6F175D3DCCD1}">
+              <a14:hiddenFill xmlns:a14="http://schemas.microsoft.com/office/drawing/2010/main">
+                <a:solidFill>
+                  <a:srgbClr val="FFFFFF"/>
+                </a:solidFill>
+              </a14:hiddenFill>
+            </a:ext>
+          </a:extLst>
+        </p:spPr>
+      </p:pic>
+      <p:sp>
+        <p:nvSpPr>
+          <p:cNvPr id="41" name="TextBox 40"/>
+          <p:cNvSpPr txBox="1"/>
+          <p:nvPr/>
+        </p:nvSpPr>
+        <p:spPr>
+          <a:xfrm>
+            <a:off x="4241938" y="5450153"/>
+            <a:ext cx="580608" cy="338554"/>
+          </a:xfrm>
+          <a:prstGeom prst="rect">
+            <a:avLst/>
+          </a:prstGeom>
+          <a:noFill/>
+        </p:spPr>
+        <p:txBody>
+          <a:bodyPr wrap="none" rtlCol="0">
+            <a:spAutoFit/>
+          </a:bodyPr>
+          <a:lstStyle/>
+          <a:p>
+            <a:r>
+              <a:rPr lang="de-DE" sz="1600" dirty="0">
+                <a:solidFill>
+                  <a:schemeClr val="tx1">
+                    <a:lumMod val="65000"/>
+                    <a:lumOff val="35000"/>
+                  </a:schemeClr>
+                </a:solidFill>
+              </a:rPr>
+              <a:t>VM1</a:t>
+            </a:r>
+          </a:p>
+        </p:txBody>
+      </p:sp>
+      <p:sp>
+        <p:nvSpPr>
+          <p:cNvPr id="42" name="TextBox 41"/>
+          <p:cNvSpPr txBox="1"/>
+          <p:nvPr/>
+        </p:nvSpPr>
+        <p:spPr>
+          <a:xfrm>
+            <a:off x="7074862" y="5459929"/>
+            <a:ext cx="580608" cy="338554"/>
+          </a:xfrm>
+          <a:prstGeom prst="rect">
+            <a:avLst/>
+          </a:prstGeom>
+          <a:noFill/>
+        </p:spPr>
+        <p:txBody>
+          <a:bodyPr wrap="none" rtlCol="0">
+            <a:spAutoFit/>
+          </a:bodyPr>
+          <a:lstStyle/>
+          <a:p>
+            <a:r>
+              <a:rPr lang="de-DE" sz="1600" dirty="0">
+                <a:solidFill>
+                  <a:schemeClr val="tx1">
+                    <a:lumMod val="65000"/>
+                    <a:lumOff val="35000"/>
+                  </a:schemeClr>
+                </a:solidFill>
+              </a:rPr>
+              <a:t>VM2</a:t>
+            </a:r>
+          </a:p>
+        </p:txBody>
+      </p:sp>
+      <p:cxnSp>
+        <p:nvCxnSpPr>
+          <p:cNvPr id="44" name="Straight Connector 43"/>
+          <p:cNvCxnSpPr/>
+          <p:nvPr/>
+        </p:nvCxnSpPr>
+        <p:spPr>
+          <a:xfrm flipH="1">
+            <a:off x="5725121" y="3931210"/>
+            <a:ext cx="4158" cy="595230"/>
+          </a:xfrm>
+          <a:prstGeom prst="line">
+            <a:avLst/>
+          </a:prstGeom>
+          <a:ln>
+            <a:solidFill>
+              <a:schemeClr val="tx1"/>
+            </a:solidFill>
+            <a:headEnd type="none"/>
+            <a:tailEnd type="none"/>
+          </a:ln>
+        </p:spPr>
+        <p:style>
+          <a:lnRef idx="1">
+            <a:schemeClr val="accent1"/>
+          </a:lnRef>
+          <a:fillRef idx="0">
+            <a:schemeClr val="accent1"/>
+          </a:fillRef>
+          <a:effectRef idx="0">
+            <a:schemeClr val="accent1"/>
+          </a:effectRef>
+          <a:fontRef idx="minor">
+            <a:schemeClr val="tx1"/>
+          </a:fontRef>
+        </p:style>
+      </p:cxnSp>
+      <p:sp>
+        <p:nvSpPr>
+          <p:cNvPr id="49" name="TextBox 48"/>
+          <p:cNvSpPr txBox="1"/>
+          <p:nvPr/>
+        </p:nvSpPr>
+        <p:spPr>
+          <a:xfrm>
+            <a:off x="5637937" y="4233116"/>
+            <a:ext cx="548548" cy="338554"/>
+          </a:xfrm>
+          <a:prstGeom prst="rect">
+            <a:avLst/>
+          </a:prstGeom>
+          <a:noFill/>
+        </p:spPr>
+        <p:txBody>
+          <a:bodyPr wrap="none" rtlCol="0">
+            <a:spAutoFit/>
+          </a:bodyPr>
+          <a:lstStyle/>
+          <a:p>
+            <a:r>
+              <a:rPr lang="de-DE" sz="1600" b="1" dirty="0">
+                <a:solidFill>
+                  <a:schemeClr val="tx1">
+                    <a:lumMod val="65000"/>
+                    <a:lumOff val="35000"/>
+                  </a:schemeClr>
+                </a:solidFill>
+              </a:rPr>
+              <a:t>.100</a:t>
+            </a:r>
+          </a:p>
+        </p:txBody>
+      </p:sp>
+      <p:pic>
+        <p:nvPicPr>
+          <p:cNvPr id="50" name="Picture 2" descr="http://design.ubuntu.com/wp-content/uploads/ubuntu-logo112.png"/>
+          <p:cNvPicPr>
+            <a:picLocks noChangeAspect="1" noChangeArrowheads="1"/>
+          </p:cNvPicPr>
+          <p:nvPr/>
+        </p:nvPicPr>
+        <p:blipFill rotWithShape="1">
+          <a:blip r:embed="rId2">
+            <a:clrChange>
+              <a:clrFrom>
+                <a:srgbClr val="FFFFFF"/>
+              </a:clrFrom>
+              <a:clrTo>
+                <a:srgbClr val="FFFFFF">
+                  <a:alpha val="0"/>
+                </a:srgbClr>
+              </a:clrTo>
+            </a:clrChange>
+            <a:duotone>
+              <a:schemeClr val="accent6">
+                <a:shade val="45000"/>
+                <a:satMod val="135000"/>
+              </a:schemeClr>
+              <a:prstClr val="white"/>
+            </a:duotone>
+            <a:extLst>
+              <a:ext uri="{28A0092B-C50C-407E-A947-70E740481C1C}">
+                <a14:useLocalDpi xmlns:a14="http://schemas.microsoft.com/office/drawing/2010/main" val="0"/>
+              </a:ext>
+            </a:extLst>
+          </a:blip>
+          <a:srcRect l="20695" r="23109" b="32515"/>
+          <a:stretch/>
+        </p:blipFill>
+        <p:spPr bwMode="auto">
+          <a:xfrm>
+            <a:off x="3515449" y="3042086"/>
+            <a:ext cx="656161" cy="627751"/>
+          </a:xfrm>
+          <a:prstGeom prst="rect">
+            <a:avLst/>
+          </a:prstGeom>
+          <a:noFill/>
+          <a:extLst>
+            <a:ext uri="{909E8E84-426E-40DD-AFC4-6F175D3DCCD1}">
+              <a14:hiddenFill xmlns:a14="http://schemas.microsoft.com/office/drawing/2010/main">
+                <a:solidFill>
+                  <a:srgbClr val="FFFFFF"/>
+                </a:solidFill>
+              </a14:hiddenFill>
+            </a:ext>
+          </a:extLst>
+        </p:spPr>
+      </p:pic>
+      <p:pic>
+        <p:nvPicPr>
+          <p:cNvPr id="3078" name="Picture 6" descr="https://azure.microsoft.com/svghandler/load-balancer/?width=600&amp;height=315"/>
+          <p:cNvPicPr>
+            <a:picLocks noChangeAspect="1" noChangeArrowheads="1"/>
+          </p:cNvPicPr>
+          <p:nvPr/>
+        </p:nvPicPr>
+        <p:blipFill rotWithShape="1">
+          <a:blip r:embed="rId3">
+            <a:extLst>
+              <a:ext uri="{28A0092B-C50C-407E-A947-70E740481C1C}">
+                <a14:useLocalDpi xmlns:a14="http://schemas.microsoft.com/office/drawing/2010/main" val="0"/>
+              </a:ext>
+            </a:extLst>
+          </a:blip>
+          <a:srcRect l="20489" r="23142"/>
+          <a:stretch/>
+        </p:blipFill>
+        <p:spPr bwMode="auto">
+          <a:xfrm>
+            <a:off x="5262561" y="3367753"/>
+            <a:ext cx="891178" cy="830007"/>
+          </a:xfrm>
+          <a:prstGeom prst="rect">
+            <a:avLst/>
+          </a:prstGeom>
+          <a:noFill/>
+          <a:extLst>
+            <a:ext uri="{909E8E84-426E-40DD-AFC4-6F175D3DCCD1}">
+              <a14:hiddenFill xmlns:a14="http://schemas.microsoft.com/office/drawing/2010/main">
+                <a:solidFill>
+                  <a:srgbClr val="FFFFFF"/>
+                </a:solidFill>
+              </a14:hiddenFill>
+            </a:ext>
+          </a:extLst>
+        </p:spPr>
+      </p:pic>
+      <p:sp>
+        <p:nvSpPr>
+          <p:cNvPr id="51" name="TextBox 50"/>
+          <p:cNvSpPr txBox="1"/>
+          <p:nvPr/>
+        </p:nvSpPr>
+        <p:spPr>
+          <a:xfrm>
+            <a:off x="2593411" y="2174862"/>
+            <a:ext cx="2552716" cy="584775"/>
+          </a:xfrm>
+          <a:prstGeom prst="rect">
+            <a:avLst/>
+          </a:prstGeom>
+          <a:noFill/>
+        </p:spPr>
+        <p:txBody>
+          <a:bodyPr wrap="square" rtlCol="0">
+            <a:spAutoFit/>
+          </a:bodyPr>
+          <a:lstStyle/>
+          <a:p>
+            <a:pPr algn="ctr"/>
+            <a:r>
+              <a:rPr lang="de-DE" sz="1600" dirty="0">
+                <a:solidFill>
+                  <a:schemeClr val="accent6">
+                    <a:lumMod val="75000"/>
+                  </a:schemeClr>
+                </a:solidFill>
+              </a:rPr>
+              <a:t>VMSS with Linux-based NVAs (iptables)</a:t>
+            </a:r>
+          </a:p>
+        </p:txBody>
+      </p:sp>
+      <p:sp>
+        <p:nvSpPr>
+          <p:cNvPr id="52" name="TextBox 51"/>
+          <p:cNvSpPr txBox="1"/>
+          <p:nvPr/>
+        </p:nvSpPr>
+        <p:spPr>
+          <a:xfrm>
+            <a:off x="5954100" y="3312082"/>
+            <a:ext cx="1150400" cy="830997"/>
+          </a:xfrm>
+          <a:prstGeom prst="rect">
+            <a:avLst/>
+          </a:prstGeom>
+          <a:noFill/>
+        </p:spPr>
+        <p:txBody>
+          <a:bodyPr wrap="square" rtlCol="0">
+            <a:spAutoFit/>
+          </a:bodyPr>
+          <a:lstStyle/>
+          <a:p>
+            <a:pPr algn="ctr"/>
+            <a:r>
+              <a:rPr lang="de-DE" sz="1600" dirty="0">
+                <a:solidFill>
+                  <a:schemeClr val="tx1">
+                    <a:lumMod val="65000"/>
+                    <a:lumOff val="35000"/>
+                  </a:schemeClr>
+                </a:solidFill>
+              </a:rPr>
+              <a:t>Internal LB</a:t>
+            </a:r>
+          </a:p>
+          <a:p>
+            <a:pPr algn="ctr"/>
+            <a:r>
+              <a:rPr lang="de-DE" sz="1600" dirty="0">
+                <a:solidFill>
+                  <a:schemeClr val="tx1">
+                    <a:lumMod val="65000"/>
+                    <a:lumOff val="35000"/>
+                  </a:schemeClr>
+                </a:solidFill>
+              </a:rPr>
+              <a:t>with DSR rule</a:t>
+            </a:r>
+          </a:p>
+        </p:txBody>
+      </p:sp>
+      <p:pic>
+        <p:nvPicPr>
+          <p:cNvPr id="55" name="Picture 2" descr="http://design.ubuntu.com/wp-content/uploads/ubuntu-logo112.png"/>
+          <p:cNvPicPr>
+            <a:picLocks noChangeAspect="1" noChangeArrowheads="1"/>
+          </p:cNvPicPr>
+          <p:nvPr/>
+        </p:nvPicPr>
+        <p:blipFill rotWithShape="1">
+          <a:blip r:embed="rId2">
+            <a:clrChange>
+              <a:clrFrom>
+                <a:srgbClr val="FFFFFF"/>
+              </a:clrFrom>
+              <a:clrTo>
+                <a:srgbClr val="FFFFFF">
+                  <a:alpha val="0"/>
+                </a:srgbClr>
+              </a:clrTo>
+            </a:clrChange>
+            <a:duotone>
+              <a:schemeClr val="accent6">
+                <a:shade val="45000"/>
+                <a:satMod val="135000"/>
+              </a:schemeClr>
+              <a:prstClr val="white"/>
+            </a:duotone>
+            <a:extLst>
+              <a:ext uri="{28A0092B-C50C-407E-A947-70E740481C1C}">
+                <a14:useLocalDpi xmlns:a14="http://schemas.microsoft.com/office/drawing/2010/main" val="0"/>
+              </a:ext>
+            </a:extLst>
+          </a:blip>
+          <a:srcRect l="20695" r="23109" b="32515"/>
+          <a:stretch/>
+        </p:blipFill>
+        <p:spPr bwMode="auto">
+          <a:xfrm>
+            <a:off x="3692077" y="3185450"/>
+            <a:ext cx="656161" cy="627751"/>
+          </a:xfrm>
+          <a:prstGeom prst="rect">
+            <a:avLst/>
+          </a:prstGeom>
+          <a:noFill/>
+          <a:extLst>
+            <a:ext uri="{909E8E84-426E-40DD-AFC4-6F175D3DCCD1}">
+              <a14:hiddenFill xmlns:a14="http://schemas.microsoft.com/office/drawing/2010/main">
+                <a:solidFill>
+                  <a:srgbClr val="FFFFFF"/>
+                </a:solidFill>
+              </a14:hiddenFill>
+            </a:ext>
+          </a:extLst>
+        </p:spPr>
+      </p:pic>
+      <p:grpSp>
+        <p:nvGrpSpPr>
+          <p:cNvPr id="62" name="Group 61"/>
+          <p:cNvGrpSpPr/>
+          <p:nvPr/>
+        </p:nvGrpSpPr>
+        <p:grpSpPr>
+          <a:xfrm>
+            <a:off x="3774394" y="6046204"/>
+            <a:ext cx="2011363" cy="304800"/>
+            <a:chOff x="1722437" y="4945062"/>
+            <a:chExt cx="4191000" cy="304800"/>
+          </a:xfrm>
+        </p:grpSpPr>
+        <p:cxnSp>
+          <p:nvCxnSpPr>
+            <p:cNvPr id="63" name="Straight Connector 62"/>
+            <p:cNvCxnSpPr/>
+            <p:nvPr/>
+          </p:nvCxnSpPr>
+          <p:spPr>
+            <a:xfrm>
+              <a:off x="1722437" y="5097462"/>
+              <a:ext cx="4191000" cy="0"/>
+            </a:xfrm>
+            <a:prstGeom prst="line">
+              <a:avLst/>
+            </a:prstGeom>
+            <a:ln>
+              <a:solidFill>
+                <a:schemeClr val="tx1"/>
+              </a:solidFill>
+              <a:headEnd type="none"/>
+              <a:tailEnd type="none"/>
+            </a:ln>
+          </p:spPr>
+          <p:style>
+            <a:lnRef idx="1">
+              <a:schemeClr val="accent1"/>
+            </a:lnRef>
+            <a:fillRef idx="0">
+              <a:schemeClr val="accent1"/>
+            </a:fillRef>
+            <a:effectRef idx="0">
+              <a:schemeClr val="accent1"/>
+            </a:effectRef>
+            <a:fontRef idx="minor">
+              <a:schemeClr val="tx1"/>
+            </a:fontRef>
+          </p:style>
+        </p:cxnSp>
+        <p:cxnSp>
+          <p:nvCxnSpPr>
+            <p:cNvPr id="64" name="Straight Connector 63"/>
+            <p:cNvCxnSpPr/>
+            <p:nvPr/>
+          </p:nvCxnSpPr>
+          <p:spPr>
+            <a:xfrm flipV="1">
+              <a:off x="1722437" y="4945062"/>
+              <a:ext cx="0" cy="304800"/>
+            </a:xfrm>
+            <a:prstGeom prst="line">
+              <a:avLst/>
+            </a:prstGeom>
+            <a:ln>
+              <a:solidFill>
+                <a:schemeClr val="tx1"/>
+              </a:solidFill>
+              <a:headEnd type="none"/>
+              <a:tailEnd type="none"/>
+            </a:ln>
+          </p:spPr>
+          <p:style>
+            <a:lnRef idx="1">
+              <a:schemeClr val="accent1"/>
+            </a:lnRef>
+            <a:fillRef idx="0">
+              <a:schemeClr val="accent1"/>
+            </a:fillRef>
+            <a:effectRef idx="0">
+              <a:schemeClr val="accent1"/>
+            </a:effectRef>
+            <a:fontRef idx="minor">
+              <a:schemeClr val="tx1"/>
+            </a:fontRef>
+          </p:style>
+        </p:cxnSp>
+        <p:cxnSp>
+          <p:nvCxnSpPr>
+            <p:cNvPr id="65" name="Straight Connector 64"/>
+            <p:cNvCxnSpPr/>
+            <p:nvPr/>
+          </p:nvCxnSpPr>
+          <p:spPr>
+            <a:xfrm flipV="1">
+              <a:off x="5913437" y="4945062"/>
+              <a:ext cx="0" cy="304800"/>
+            </a:xfrm>
+            <a:prstGeom prst="line">
+              <a:avLst/>
+            </a:prstGeom>
+            <a:ln>
+              <a:solidFill>
+                <a:schemeClr val="tx1"/>
+              </a:solidFill>
+              <a:headEnd type="none"/>
+              <a:tailEnd type="none"/>
+            </a:ln>
+          </p:spPr>
+          <p:style>
+            <a:lnRef idx="1">
+              <a:schemeClr val="accent1"/>
+            </a:lnRef>
+            <a:fillRef idx="0">
+              <a:schemeClr val="accent1"/>
+            </a:fillRef>
+            <a:effectRef idx="0">
+              <a:schemeClr val="accent1"/>
+            </a:effectRef>
+            <a:fontRef idx="minor">
+              <a:schemeClr val="tx1"/>
+            </a:fontRef>
+          </p:style>
+        </p:cxnSp>
+      </p:grpSp>
+      <p:sp>
+        <p:nvSpPr>
+          <p:cNvPr id="66" name="TextBox 65"/>
+          <p:cNvSpPr txBox="1"/>
+          <p:nvPr/>
+        </p:nvSpPr>
+        <p:spPr>
+          <a:xfrm>
+            <a:off x="4064622" y="6052376"/>
+            <a:ext cx="1212511" cy="489365"/>
+          </a:xfrm>
+          <a:prstGeom prst="rect">
+            <a:avLst/>
+          </a:prstGeom>
+          <a:noFill/>
+        </p:spPr>
+        <p:txBody>
+          <a:bodyPr wrap="none" lIns="182880" tIns="146304" rIns="182880" bIns="146304" rtlCol="0">
+            <a:spAutoFit/>
+          </a:bodyPr>
+          <a:lstStyle/>
+          <a:p>
+            <a:pPr>
+              <a:lnSpc>
+                <a:spcPct val="90000"/>
+              </a:lnSpc>
+              <a:spcAft>
+                <a:spcPts val="600"/>
+              </a:spcAft>
+            </a:pPr>
+            <a:r>
+              <a:rPr lang="en-US" sz="1400" dirty="0">
+                <a:solidFill>
+                  <a:schemeClr val="tx1">
+                    <a:lumMod val="65000"/>
+                    <a:lumOff val="35000"/>
+                  </a:schemeClr>
+                </a:solidFill>
+              </a:rPr>
+              <a:t>10.1.1.0/24</a:t>
+            </a:r>
+          </a:p>
+        </p:txBody>
+      </p:sp>
+      <p:sp>
+        <p:nvSpPr>
+          <p:cNvPr id="67" name="TextBox 66"/>
+          <p:cNvSpPr txBox="1"/>
+          <p:nvPr/>
+        </p:nvSpPr>
+        <p:spPr>
+          <a:xfrm>
+            <a:off x="3941272" y="5893112"/>
+            <a:ext cx="340158" cy="338554"/>
+          </a:xfrm>
+          <a:prstGeom prst="rect">
+            <a:avLst/>
+          </a:prstGeom>
+          <a:noFill/>
+        </p:spPr>
+        <p:txBody>
+          <a:bodyPr wrap="none" rtlCol="0">
+            <a:spAutoFit/>
+          </a:bodyPr>
+          <a:lstStyle/>
+          <a:p>
+            <a:r>
+              <a:rPr lang="de-DE" sz="1600" dirty="0">
+                <a:solidFill>
+                  <a:schemeClr val="tx1">
+                    <a:lumMod val="65000"/>
+                    <a:lumOff val="35000"/>
+                  </a:schemeClr>
+                </a:solidFill>
+              </a:rPr>
+              <a:t>.4</a:t>
+            </a:r>
+          </a:p>
+        </p:txBody>
+      </p:sp>
+      <p:grpSp>
+        <p:nvGrpSpPr>
+          <p:cNvPr id="68" name="Group 67"/>
+          <p:cNvGrpSpPr/>
+          <p:nvPr/>
+        </p:nvGrpSpPr>
+        <p:grpSpPr>
+          <a:xfrm>
+            <a:off x="6539365" y="6040032"/>
+            <a:ext cx="2011363" cy="304800"/>
+            <a:chOff x="1722437" y="4945062"/>
+            <a:chExt cx="4191000" cy="304800"/>
+          </a:xfrm>
+        </p:grpSpPr>
+        <p:cxnSp>
+          <p:nvCxnSpPr>
+            <p:cNvPr id="69" name="Straight Connector 68"/>
+            <p:cNvCxnSpPr/>
+            <p:nvPr/>
+          </p:nvCxnSpPr>
+          <p:spPr>
+            <a:xfrm>
+              <a:off x="1722437" y="5097462"/>
+              <a:ext cx="4191000" cy="0"/>
+            </a:xfrm>
+            <a:prstGeom prst="line">
+              <a:avLst/>
+            </a:prstGeom>
+            <a:ln>
+              <a:solidFill>
+                <a:schemeClr val="tx1"/>
+              </a:solidFill>
+              <a:headEnd type="none"/>
+              <a:tailEnd type="none"/>
+            </a:ln>
+          </p:spPr>
+          <p:style>
+            <a:lnRef idx="1">
+              <a:schemeClr val="accent1"/>
+            </a:lnRef>
+            <a:fillRef idx="0">
+              <a:schemeClr val="accent1"/>
+            </a:fillRef>
+            <a:effectRef idx="0">
+              <a:schemeClr val="accent1"/>
+            </a:effectRef>
+            <a:fontRef idx="minor">
+              <a:schemeClr val="tx1"/>
+            </a:fontRef>
+          </p:style>
+        </p:cxnSp>
+        <p:cxnSp>
+          <p:nvCxnSpPr>
+            <p:cNvPr id="70" name="Straight Connector 69"/>
+            <p:cNvCxnSpPr/>
+            <p:nvPr/>
+          </p:nvCxnSpPr>
+          <p:spPr>
+            <a:xfrm flipV="1">
+              <a:off x="1722437" y="4945062"/>
+              <a:ext cx="0" cy="304800"/>
+            </a:xfrm>
+            <a:prstGeom prst="line">
+              <a:avLst/>
+            </a:prstGeom>
+            <a:ln>
+              <a:solidFill>
+                <a:schemeClr val="tx1"/>
+              </a:solidFill>
+              <a:headEnd type="none"/>
+              <a:tailEnd type="none"/>
+            </a:ln>
+          </p:spPr>
+          <p:style>
+            <a:lnRef idx="1">
+              <a:schemeClr val="accent1"/>
+            </a:lnRef>
+            <a:fillRef idx="0">
+              <a:schemeClr val="accent1"/>
+            </a:fillRef>
+            <a:effectRef idx="0">
+              <a:schemeClr val="accent1"/>
+            </a:effectRef>
+            <a:fontRef idx="minor">
+              <a:schemeClr val="tx1"/>
+            </a:fontRef>
+          </p:style>
+        </p:cxnSp>
+        <p:cxnSp>
+          <p:nvCxnSpPr>
+            <p:cNvPr id="71" name="Straight Connector 70"/>
+            <p:cNvCxnSpPr/>
+            <p:nvPr/>
+          </p:nvCxnSpPr>
+          <p:spPr>
+            <a:xfrm flipV="1">
+              <a:off x="5913437" y="4945062"/>
+              <a:ext cx="0" cy="304800"/>
+            </a:xfrm>
+            <a:prstGeom prst="line">
+              <a:avLst/>
+            </a:prstGeom>
+            <a:ln>
+              <a:solidFill>
+                <a:schemeClr val="tx1"/>
+              </a:solidFill>
+              <a:headEnd type="none"/>
+              <a:tailEnd type="none"/>
+            </a:ln>
+          </p:spPr>
+          <p:style>
+            <a:lnRef idx="1">
+              <a:schemeClr val="accent1"/>
+            </a:lnRef>
+            <a:fillRef idx="0">
+              <a:schemeClr val="accent1"/>
+            </a:fillRef>
+            <a:effectRef idx="0">
+              <a:schemeClr val="accent1"/>
+            </a:effectRef>
+            <a:fontRef idx="minor">
+              <a:schemeClr val="tx1"/>
+            </a:fontRef>
+          </p:style>
+        </p:cxnSp>
+      </p:grpSp>
+      <p:sp>
+        <p:nvSpPr>
+          <p:cNvPr id="72" name="TextBox 71"/>
+          <p:cNvSpPr txBox="1"/>
+          <p:nvPr/>
+        </p:nvSpPr>
+        <p:spPr>
+          <a:xfrm>
+            <a:off x="6829593" y="6046204"/>
+            <a:ext cx="1212511" cy="489365"/>
+          </a:xfrm>
+          <a:prstGeom prst="rect">
+            <a:avLst/>
+          </a:prstGeom>
+          <a:noFill/>
+        </p:spPr>
+        <p:txBody>
+          <a:bodyPr wrap="none" lIns="182880" tIns="146304" rIns="182880" bIns="146304" rtlCol="0">
+            <a:spAutoFit/>
+          </a:bodyPr>
+          <a:lstStyle/>
+          <a:p>
+            <a:pPr>
+              <a:lnSpc>
+                <a:spcPct val="90000"/>
+              </a:lnSpc>
+              <a:spcAft>
+                <a:spcPts val="600"/>
+              </a:spcAft>
+            </a:pPr>
+            <a:r>
+              <a:rPr lang="en-US" sz="1400" dirty="0">
+                <a:solidFill>
+                  <a:schemeClr val="tx1">
+                    <a:lumMod val="65000"/>
+                    <a:lumOff val="35000"/>
+                  </a:schemeClr>
+                </a:solidFill>
+              </a:rPr>
+              <a:t>10.2.1.0/24</a:t>
+            </a:r>
+          </a:p>
+        </p:txBody>
+      </p:sp>
+      <p:sp>
+        <p:nvSpPr>
+          <p:cNvPr id="73" name="TextBox 72"/>
+          <p:cNvSpPr txBox="1"/>
+          <p:nvPr/>
+        </p:nvSpPr>
+        <p:spPr>
+          <a:xfrm>
+            <a:off x="6706243" y="5886940"/>
+            <a:ext cx="340158" cy="338554"/>
+          </a:xfrm>
+          <a:prstGeom prst="rect">
+            <a:avLst/>
+          </a:prstGeom>
+          <a:noFill/>
+        </p:spPr>
+        <p:txBody>
+          <a:bodyPr wrap="none" rtlCol="0">
+            <a:spAutoFit/>
+          </a:bodyPr>
+          <a:lstStyle/>
+          <a:p>
+            <a:r>
+              <a:rPr lang="de-DE" sz="1600" dirty="0">
+                <a:solidFill>
+                  <a:schemeClr val="tx1">
+                    <a:lumMod val="65000"/>
+                    <a:lumOff val="35000"/>
+                  </a:schemeClr>
+                </a:solidFill>
+              </a:rPr>
+              <a:t>.4</a:t>
+            </a:r>
+          </a:p>
+        </p:txBody>
+      </p:sp>
+      <p:cxnSp>
+        <p:nvCxnSpPr>
+          <p:cNvPr id="74" name="Straight Connector 73"/>
+          <p:cNvCxnSpPr/>
+          <p:nvPr/>
+        </p:nvCxnSpPr>
+        <p:spPr>
+          <a:xfrm flipH="1">
+            <a:off x="3985547" y="5589325"/>
+            <a:ext cx="4158" cy="595230"/>
+          </a:xfrm>
+          <a:prstGeom prst="line">
+            <a:avLst/>
+          </a:prstGeom>
+          <a:ln>
+            <a:solidFill>
+              <a:schemeClr val="tx1"/>
+            </a:solidFill>
+            <a:headEnd type="none"/>
+            <a:tailEnd type="none"/>
+          </a:ln>
+        </p:spPr>
+        <p:style>
+          <a:lnRef idx="1">
+            <a:schemeClr val="accent1"/>
+          </a:lnRef>
+          <a:fillRef idx="0">
+            <a:schemeClr val="accent1"/>
+          </a:fillRef>
+          <a:effectRef idx="0">
+            <a:schemeClr val="accent1"/>
+          </a:effectRef>
+          <a:fontRef idx="minor">
+            <a:schemeClr val="tx1"/>
+          </a:fontRef>
+        </p:style>
+      </p:cxnSp>
+      <p:cxnSp>
+        <p:nvCxnSpPr>
+          <p:cNvPr id="75" name="Straight Connector 74"/>
+          <p:cNvCxnSpPr/>
+          <p:nvPr/>
+        </p:nvCxnSpPr>
+        <p:spPr>
+          <a:xfrm flipH="1">
+            <a:off x="6739918" y="5579712"/>
+            <a:ext cx="4158" cy="595230"/>
+          </a:xfrm>
+          <a:prstGeom prst="line">
+            <a:avLst/>
+          </a:prstGeom>
+          <a:ln>
+            <a:solidFill>
+              <a:schemeClr val="tx1"/>
+            </a:solidFill>
+            <a:headEnd type="none"/>
+            <a:tailEnd type="none"/>
+          </a:ln>
+        </p:spPr>
+        <p:style>
+          <a:lnRef idx="1">
+            <a:schemeClr val="accent1"/>
+          </a:lnRef>
+          <a:fillRef idx="0">
+            <a:schemeClr val="accent1"/>
+          </a:fillRef>
+          <a:effectRef idx="0">
+            <a:schemeClr val="accent1"/>
+          </a:effectRef>
+          <a:fontRef idx="minor">
+            <a:schemeClr val="tx1"/>
+          </a:fontRef>
+        </p:style>
+      </p:cxnSp>
+      <p:pic>
+        <p:nvPicPr>
+          <p:cNvPr id="9" name="Picture 2" descr="http://design.ubuntu.com/wp-content/uploads/ubuntu-logo112.png"/>
+          <p:cNvPicPr>
+            <a:picLocks noChangeAspect="1" noChangeArrowheads="1"/>
+          </p:cNvPicPr>
+          <p:nvPr/>
+        </p:nvPicPr>
+        <p:blipFill rotWithShape="1">
+          <a:blip r:embed="rId2">
+            <a:clrChange>
+              <a:clrFrom>
+                <a:srgbClr val="FFFFFF"/>
+              </a:clrFrom>
+              <a:clrTo>
+                <a:srgbClr val="FFFFFF">
+                  <a:alpha val="0"/>
+                </a:srgbClr>
+              </a:clrTo>
+            </a:clrChange>
+            <a:extLst>
+              <a:ext uri="{28A0092B-C50C-407E-A947-70E740481C1C}">
+                <a14:useLocalDpi xmlns:a14="http://schemas.microsoft.com/office/drawing/2010/main" val="0"/>
+              </a:ext>
+            </a:extLst>
+          </a:blip>
+          <a:srcRect l="20695" r="23109" b="32515"/>
+          <a:stretch/>
+        </p:blipFill>
+        <p:spPr bwMode="auto">
+          <a:xfrm>
+            <a:off x="3666434" y="5313702"/>
+            <a:ext cx="656161" cy="627751"/>
+          </a:xfrm>
+          <a:prstGeom prst="rect">
+            <a:avLst/>
+          </a:prstGeom>
+          <a:noFill/>
+          <a:extLst>
+            <a:ext uri="{909E8E84-426E-40DD-AFC4-6F175D3DCCD1}">
+              <a14:hiddenFill xmlns:a14="http://schemas.microsoft.com/office/drawing/2010/main">
+                <a:solidFill>
+                  <a:srgbClr val="FFFFFF"/>
+                </a:solidFill>
+              </a14:hiddenFill>
+            </a:ext>
+          </a:extLst>
+        </p:spPr>
+      </p:pic>
+      <p:pic>
+        <p:nvPicPr>
+          <p:cNvPr id="31" name="Picture 2" descr="http://design.ubuntu.com/wp-content/uploads/ubuntu-logo112.png"/>
+          <p:cNvPicPr>
+            <a:picLocks noChangeAspect="1" noChangeArrowheads="1"/>
+          </p:cNvPicPr>
+          <p:nvPr/>
+        </p:nvPicPr>
+        <p:blipFill rotWithShape="1">
+          <a:blip r:embed="rId2">
+            <a:clrChange>
+              <a:clrFrom>
+                <a:srgbClr val="FFFFFF"/>
+              </a:clrFrom>
+              <a:clrTo>
+                <a:srgbClr val="FFFFFF">
+                  <a:alpha val="0"/>
+                </a:srgbClr>
+              </a:clrTo>
+            </a:clrChange>
+            <a:extLst>
+              <a:ext uri="{28A0092B-C50C-407E-A947-70E740481C1C}">
+                <a14:useLocalDpi xmlns:a14="http://schemas.microsoft.com/office/drawing/2010/main" val="0"/>
+              </a:ext>
+            </a:extLst>
+          </a:blip>
+          <a:srcRect l="20695" r="23109" b="32515"/>
+          <a:stretch/>
+        </p:blipFill>
+        <p:spPr bwMode="auto">
+          <a:xfrm>
+            <a:off x="6431405" y="5307530"/>
+            <a:ext cx="656161" cy="627751"/>
+          </a:xfrm>
+          <a:prstGeom prst="rect">
+            <a:avLst/>
+          </a:prstGeom>
+          <a:noFill/>
+          <a:extLst>
+            <a:ext uri="{909E8E84-426E-40DD-AFC4-6F175D3DCCD1}">
+              <a14:hiddenFill xmlns:a14="http://schemas.microsoft.com/office/drawing/2010/main">
+                <a:solidFill>
+                  <a:srgbClr val="FFFFFF"/>
+                </a:solidFill>
+              </a14:hiddenFill>
+            </a:ext>
+          </a:extLst>
+        </p:spPr>
+      </p:pic>
+      <p:cxnSp>
+        <p:nvCxnSpPr>
+          <p:cNvPr id="7" name="Straight Connector 6"/>
+          <p:cNvCxnSpPr/>
+          <p:nvPr/>
+        </p:nvCxnSpPr>
+        <p:spPr>
+          <a:xfrm>
+            <a:off x="5638800" y="3845259"/>
+            <a:ext cx="914400" cy="914400"/>
+          </a:xfrm>
+          <a:prstGeom prst="line">
+            <a:avLst/>
+          </a:prstGeom>
+        </p:spPr>
+        <p:style>
+          <a:lnRef idx="1">
+            <a:schemeClr val="accent1"/>
+          </a:lnRef>
+          <a:fillRef idx="0">
+            <a:schemeClr val="accent1"/>
+          </a:fillRef>
+          <a:effectRef idx="0">
+            <a:schemeClr val="accent1"/>
+          </a:effectRef>
+          <a:fontRef idx="minor">
+            <a:schemeClr val="tx1"/>
+          </a:fontRef>
+        </p:style>
+      </p:cxnSp>
+      <mc:AlternateContent xmlns:mc="http://schemas.openxmlformats.org/markup-compatibility/2006">
+        <mc:Choice xmlns:p14="http://schemas.microsoft.com/office/powerpoint/2010/main" Requires="p14">
+          <p:contentPart p14:bwMode="auto" r:id="rId4">
+            <p14:nvContentPartPr>
+              <p14:cNvPr id="10" name="Ink 9"/>
+              <p14:cNvContentPartPr/>
+              <p14:nvPr/>
+            </p14:nvContentPartPr>
+            <p14:xfrm>
+              <a:off x="4201060" y="2768239"/>
+              <a:ext cx="3383460" cy="2651940"/>
+            </p14:xfrm>
+          </p:contentPart>
+        </mc:Choice>
+        <mc:Fallback>
+          <p:pic>
+            <p:nvPicPr>
+              <p:cNvPr id="10" name="Ink 9"/>
+              <p:cNvPicPr/>
+              <p:nvPr/>
+            </p:nvPicPr>
+            <p:blipFill>
+              <a:blip r:embed="rId5"/>
+              <a:stretch>
+                <a:fillRect/>
+              </a:stretch>
+            </p:blipFill>
+            <p:spPr>
+              <a:xfrm>
+                <a:off x="4181981" y="2749160"/>
+                <a:ext cx="3421258" cy="2689737"/>
+              </a:xfrm>
+              <a:prstGeom prst="rect">
+                <a:avLst/>
+              </a:prstGeom>
+            </p:spPr>
+          </p:pic>
+        </mc:Fallback>
+      </mc:AlternateContent>
+      <mc:AlternateContent xmlns:mc="http://schemas.openxmlformats.org/markup-compatibility/2006">
+        <mc:Choice xmlns:p14="http://schemas.microsoft.com/office/powerpoint/2010/main" Requires="p14">
+          <p:contentPart p14:bwMode="auto" r:id="rId6">
+            <p14:nvContentPartPr>
+              <p14:cNvPr id="13" name="Ink 12"/>
+              <p14:cNvContentPartPr/>
+              <p14:nvPr/>
+            </p14:nvContentPartPr>
+            <p14:xfrm>
+              <a:off x="3997840" y="2295739"/>
+              <a:ext cx="3998160" cy="2961900"/>
+            </p14:xfrm>
+          </p:contentPart>
+        </mc:Choice>
+        <mc:Fallback>
+          <p:pic>
+            <p:nvPicPr>
+              <p:cNvPr id="13" name="Ink 12"/>
+              <p:cNvPicPr/>
+              <p:nvPr/>
+            </p:nvPicPr>
+            <p:blipFill>
+              <a:blip r:embed="rId7"/>
+              <a:stretch>
+                <a:fillRect/>
+              </a:stretch>
+            </p:blipFill>
+            <p:spPr>
+              <a:xfrm>
+                <a:off x="3978760" y="2276662"/>
+                <a:ext cx="4035960" cy="2999693"/>
+              </a:xfrm>
+              <a:prstGeom prst="rect">
+                <a:avLst/>
+              </a:prstGeom>
+            </p:spPr>
+          </p:pic>
+        </mc:Fallback>
+      </mc:AlternateContent>
+      <p:cxnSp>
+        <p:nvCxnSpPr>
+          <p:cNvPr id="15" name="Straight Arrow Connector 14"/>
+          <p:cNvCxnSpPr/>
+          <p:nvPr/>
+        </p:nvCxnSpPr>
+        <p:spPr>
+          <a:xfrm flipH="1">
+            <a:off x="6825872" y="5147997"/>
+            <a:ext cx="100899" cy="113511"/>
+          </a:xfrm>
+          <a:prstGeom prst="straightConnector1">
+            <a:avLst/>
+          </a:prstGeom>
+          <a:ln w="38100">
+            <a:solidFill>
+              <a:schemeClr val="accent6">
+                <a:lumMod val="75000"/>
+              </a:schemeClr>
+            </a:solidFill>
+            <a:tailEnd type="triangle" w="lg" len="lg"/>
+          </a:ln>
+        </p:spPr>
+        <p:style>
+          <a:lnRef idx="1">
+            <a:schemeClr val="accent1"/>
+          </a:lnRef>
+          <a:fillRef idx="0">
+            <a:schemeClr val="accent1"/>
+          </a:fillRef>
+          <a:effectRef idx="0">
+            <a:schemeClr val="accent1"/>
+          </a:effectRef>
+          <a:fontRef idx="minor">
+            <a:schemeClr val="tx1"/>
+          </a:fontRef>
+        </p:style>
+      </p:cxnSp>
+      <p:cxnSp>
+        <p:nvCxnSpPr>
+          <p:cNvPr id="53" name="Straight Arrow Connector 52"/>
+          <p:cNvCxnSpPr/>
+          <p:nvPr/>
+        </p:nvCxnSpPr>
+        <p:spPr>
+          <a:xfrm flipH="1">
+            <a:off x="3985519" y="5099400"/>
+            <a:ext cx="19287" cy="174024"/>
+          </a:xfrm>
+          <a:prstGeom prst="straightConnector1">
+            <a:avLst/>
+          </a:prstGeom>
+          <a:ln w="38100">
+            <a:solidFill>
+              <a:srgbClr val="C00000"/>
+            </a:solidFill>
+            <a:tailEnd type="triangle" w="lg" len="lg"/>
+          </a:ln>
+        </p:spPr>
+        <p:style>
+          <a:lnRef idx="1">
+            <a:schemeClr val="accent1"/>
+          </a:lnRef>
+          <a:fillRef idx="0">
+            <a:schemeClr val="accent1"/>
+          </a:fillRef>
+          <a:effectRef idx="0">
+            <a:schemeClr val="accent1"/>
+          </a:effectRef>
+          <a:fontRef idx="minor">
+            <a:schemeClr val="tx1"/>
+          </a:fontRef>
+        </p:style>
+      </p:cxnSp>
+      <p:sp>
+        <p:nvSpPr>
+          <p:cNvPr id="17" name="TextBox 16"/>
+          <p:cNvSpPr txBox="1"/>
+          <p:nvPr/>
+        </p:nvSpPr>
+        <p:spPr>
+          <a:xfrm>
+            <a:off x="3687936" y="4004077"/>
+            <a:ext cx="651140" cy="1107996"/>
+          </a:xfrm>
+          <a:prstGeom prst="rect">
+            <a:avLst/>
+          </a:prstGeom>
+          <a:noFill/>
+        </p:spPr>
+        <p:txBody>
+          <a:bodyPr wrap="none" rtlCol="0">
+            <a:spAutoFit/>
+          </a:bodyPr>
+          <a:lstStyle/>
+          <a:p>
+            <a:r>
+              <a:rPr lang="en-US" sz="6600" b="1" dirty="0">
+                <a:solidFill>
+                  <a:srgbClr val="C00000"/>
+                </a:solidFill>
+              </a:rPr>
+              <a:t>X</a:t>
+            </a:r>
+          </a:p>
+        </p:txBody>
+      </p:sp>
+      <p:sp>
+        <p:nvSpPr>
+          <p:cNvPr id="18" name="Thought Bubble: Cloud 17"/>
+          <p:cNvSpPr/>
+          <p:nvPr/>
+        </p:nvSpPr>
+        <p:spPr>
+          <a:xfrm>
+            <a:off x="1243013" y="3452054"/>
+            <a:ext cx="1990725" cy="1231401"/>
+          </a:xfrm>
+          <a:prstGeom prst="cloudCallout">
+            <a:avLst>
+              <a:gd name="adj1" fmla="val 75013"/>
+              <a:gd name="adj2" fmla="val 48243"/>
+            </a:avLst>
+          </a:prstGeom>
+          <a:noFill/>
+          <a:ln>
+            <a:solidFill>
+              <a:srgbClr val="C00000"/>
+            </a:solidFill>
+          </a:ln>
+        </p:spPr>
+        <p:style>
+          <a:lnRef idx="2">
+            <a:schemeClr val="accent1">
+              <a:shade val="50000"/>
+            </a:schemeClr>
+          </a:lnRef>
+          <a:fillRef idx="1">
+            <a:schemeClr val="accent1"/>
+          </a:fillRef>
+          <a:effectRef idx="0">
+            <a:schemeClr val="accent1"/>
+          </a:effectRef>
+          <a:fontRef idx="minor">
+            <a:schemeClr val="lt1"/>
+          </a:fontRef>
+        </p:style>
+        <p:txBody>
+          <a:bodyPr rtlCol="0" anchor="ctr"/>
+          <a:lstStyle/>
+          <a:p>
+            <a:pPr algn="ctr"/>
+            <a:endParaRPr lang="en-US"/>
+          </a:p>
+        </p:txBody>
+      </p:sp>
+      <p:sp>
+        <p:nvSpPr>
+          <p:cNvPr id="20" name="TextBox 19"/>
+          <p:cNvSpPr txBox="1"/>
+          <p:nvPr/>
+        </p:nvSpPr>
+        <p:spPr>
+          <a:xfrm>
+            <a:off x="1333557" y="3661435"/>
+            <a:ext cx="1862344" cy="738664"/>
+          </a:xfrm>
+          <a:prstGeom prst="rect">
+            <a:avLst/>
+          </a:prstGeom>
+          <a:noFill/>
+        </p:spPr>
+        <p:txBody>
+          <a:bodyPr wrap="square" rtlCol="0">
+            <a:spAutoFit/>
+          </a:bodyPr>
+          <a:lstStyle/>
+          <a:p>
+            <a:pPr algn="ctr"/>
+            <a:r>
+              <a:rPr lang="en-US" sz="1400" dirty="0">
+                <a:solidFill>
+                  <a:srgbClr val="C00000"/>
+                </a:solidFill>
+              </a:rPr>
+              <a:t>Packets disappear somewhere between the NVA and VM1</a:t>
+            </a:r>
+          </a:p>
+        </p:txBody>
+      </p:sp>
+      <p:graphicFrame>
+        <p:nvGraphicFramePr>
+          <p:cNvPr id="23" name="Table 22"/>
+          <p:cNvGraphicFramePr>
+            <a:graphicFrameLocks noGrp="1"/>
+          </p:cNvGraphicFramePr>
+          <p:nvPr>
+            <p:extLst>
+              <p:ext uri="{D42A27DB-BD31-4B8C-83A1-F6EECF244321}">
+                <p14:modId xmlns:p14="http://schemas.microsoft.com/office/powerpoint/2010/main" val="149873881"/>
+              </p:ext>
+            </p:extLst>
+          </p:nvPr>
+        </p:nvGraphicFramePr>
+        <p:xfrm>
+          <a:off x="8410820" y="2174862"/>
+          <a:ext cx="3609444" cy="2225040"/>
+        </p:xfrm>
+        <a:graphic>
+          <a:graphicData uri="http://schemas.openxmlformats.org/drawingml/2006/table">
+            <a:tbl>
+              <a:tblPr firstRow="1" bandRow="1">
+                <a:tableStyleId>{7E9639D4-E3E2-4D34-9284-5A2195B3D0D7}</a:tableStyleId>
+              </a:tblPr>
+              <a:tblGrid>
+                <a:gridCol w="1203148">
+                  <a:extLst>
+                    <a:ext uri="{9D8B030D-6E8A-4147-A177-3AD203B41FA5}">
+                      <a16:colId xmlns:a16="http://schemas.microsoft.com/office/drawing/2014/main" val="3197029999"/>
+                    </a:ext>
+                  </a:extLst>
+                </a:gridCol>
+                <a:gridCol w="1203148">
+                  <a:extLst>
+                    <a:ext uri="{9D8B030D-6E8A-4147-A177-3AD203B41FA5}">
+                      <a16:colId xmlns:a16="http://schemas.microsoft.com/office/drawing/2014/main" val="384455778"/>
+                    </a:ext>
+                  </a:extLst>
+                </a:gridCol>
+                <a:gridCol w="1203148">
+                  <a:extLst>
+                    <a:ext uri="{9D8B030D-6E8A-4147-A177-3AD203B41FA5}">
+                      <a16:colId xmlns:a16="http://schemas.microsoft.com/office/drawing/2014/main" val="1502761832"/>
+                    </a:ext>
+                  </a:extLst>
+                </a:gridCol>
+              </a:tblGrid>
+              <a:tr h="370840">
+                <a:tc>
+                  <a:txBody>
+                    <a:bodyPr/>
+                    <a:lstStyle/>
+                    <a:p>
+                      <a:r>
+                        <a:rPr lang="en-US" sz="1400" dirty="0"/>
+                        <a:t>Point</a:t>
+                      </a:r>
+                    </a:p>
+                  </a:txBody>
+                  <a:tcPr/>
+                </a:tc>
+                <a:tc>
+                  <a:txBody>
+                    <a:bodyPr/>
+                    <a:lstStyle/>
+                    <a:p>
+                      <a:r>
+                        <a:rPr lang="en-US" sz="1400" dirty="0" err="1"/>
+                        <a:t>Src</a:t>
+                      </a:r>
+                      <a:r>
+                        <a:rPr lang="en-US" sz="1400" dirty="0"/>
+                        <a:t> IP</a:t>
+                      </a:r>
+                    </a:p>
+                  </a:txBody>
+                  <a:tcPr/>
+                </a:tc>
+                <a:tc>
+                  <a:txBody>
+                    <a:bodyPr/>
+                    <a:lstStyle/>
+                    <a:p>
+                      <a:r>
+                        <a:rPr lang="en-US" sz="1400" dirty="0" err="1"/>
+                        <a:t>Dst</a:t>
+                      </a:r>
+                      <a:r>
+                        <a:rPr lang="en-US" sz="1400" baseline="0" dirty="0"/>
+                        <a:t> IP</a:t>
+                      </a:r>
+                      <a:endParaRPr lang="en-US" sz="1400" dirty="0"/>
+                    </a:p>
+                  </a:txBody>
+                  <a:tcPr/>
+                </a:tc>
+                <a:extLst>
+                  <a:ext uri="{0D108BD9-81ED-4DB2-BD59-A6C34878D82A}">
+                    <a16:rowId xmlns:a16="http://schemas.microsoft.com/office/drawing/2014/main" val="3129272245"/>
+                  </a:ext>
+                </a:extLst>
+              </a:tr>
+              <a:tr h="370840">
+                <a:tc>
+                  <a:txBody>
+                    <a:bodyPr/>
+                    <a:lstStyle/>
+                    <a:p>
+                      <a:r>
+                        <a:rPr lang="en-US" sz="1400" dirty="0">
+                          <a:solidFill>
+                            <a:schemeClr val="accent6">
+                              <a:lumMod val="75000"/>
+                            </a:schemeClr>
+                          </a:solidFill>
+                        </a:rPr>
+                        <a:t>1</a:t>
+                      </a:r>
+                    </a:p>
+                  </a:txBody>
+                  <a:tcPr/>
+                </a:tc>
+                <a:tc>
+                  <a:txBody>
+                    <a:bodyPr/>
+                    <a:lstStyle/>
+                    <a:p>
+                      <a:r>
+                        <a:rPr lang="en-US" sz="1400" dirty="0">
+                          <a:solidFill>
+                            <a:schemeClr val="accent6">
+                              <a:lumMod val="75000"/>
+                            </a:schemeClr>
+                          </a:solidFill>
+                        </a:rPr>
+                        <a:t>10.1.1.4</a:t>
+                      </a:r>
+                    </a:p>
+                  </a:txBody>
+                  <a:tcPr/>
+                </a:tc>
+                <a:tc>
+                  <a:txBody>
+                    <a:bodyPr/>
+                    <a:lstStyle/>
+                    <a:p>
+                      <a:r>
+                        <a:rPr lang="en-US" sz="1400" dirty="0">
+                          <a:solidFill>
+                            <a:schemeClr val="accent6">
+                              <a:lumMod val="75000"/>
+                            </a:schemeClr>
+                          </a:solidFill>
+                        </a:rPr>
+                        <a:t>10.2.1.4</a:t>
+                      </a:r>
+                      <a:endParaRPr lang="en-US" sz="1400" dirty="0">
+                        <a:solidFill>
+                          <a:schemeClr val="accent6">
+                            <a:lumMod val="75000"/>
+                          </a:schemeClr>
+                        </a:solidFill>
+                      </a:endParaRPr>
+                    </a:p>
+                  </a:txBody>
+                  <a:tcPr/>
+                </a:tc>
+                <a:extLst>
+                  <a:ext uri="{0D108BD9-81ED-4DB2-BD59-A6C34878D82A}">
+                    <a16:rowId xmlns:a16="http://schemas.microsoft.com/office/drawing/2014/main" val="1154240873"/>
+                  </a:ext>
+                </a:extLst>
+              </a:tr>
+              <a:tr h="370840">
+                <a:tc>
+                  <a:txBody>
+                    <a:bodyPr/>
+                    <a:lstStyle/>
+                    <a:p>
+                      <a:r>
+                        <a:rPr lang="en-US" sz="1400" dirty="0">
+                          <a:solidFill>
+                            <a:schemeClr val="accent6">
+                              <a:lumMod val="75000"/>
+                            </a:schemeClr>
+                          </a:solidFill>
+                        </a:rPr>
+                        <a:t>2</a:t>
+                      </a:r>
+                    </a:p>
+                  </a:txBody>
+                  <a:tcPr/>
+                </a:tc>
+                <a:tc>
+                  <a:txBody>
+                    <a:bodyPr/>
+                    <a:lstStyle/>
+                    <a:p>
+                      <a:r>
+                        <a:rPr lang="en-US" sz="1400" dirty="0">
+                          <a:solidFill>
+                            <a:schemeClr val="accent6">
+                              <a:lumMod val="75000"/>
+                            </a:schemeClr>
+                          </a:solidFill>
+                        </a:rPr>
+                        <a:t>10.1.1.4</a:t>
+                      </a:r>
+                      <a:endParaRPr lang="en-US" sz="1400" dirty="0">
+                        <a:solidFill>
+                          <a:schemeClr val="accent6">
+                            <a:lumMod val="75000"/>
+                          </a:schemeClr>
+                        </a:solidFill>
+                      </a:endParaRPr>
+                    </a:p>
+                  </a:txBody>
+                  <a:tcPr/>
+                </a:tc>
+                <a:tc>
+                  <a:txBody>
+                    <a:bodyPr/>
+                    <a:lstStyle/>
+                    <a:p>
+                      <a:r>
+                        <a:rPr lang="en-US" sz="1400" dirty="0">
+                          <a:solidFill>
+                            <a:schemeClr val="accent6">
+                              <a:lumMod val="75000"/>
+                            </a:schemeClr>
+                          </a:solidFill>
+                        </a:rPr>
+                        <a:t>10.2.1.4</a:t>
+                      </a:r>
+                      <a:endParaRPr lang="en-US" sz="1400" dirty="0">
+                        <a:solidFill>
+                          <a:schemeClr val="accent6">
+                            <a:lumMod val="75000"/>
+                          </a:schemeClr>
+                        </a:solidFill>
+                      </a:endParaRPr>
+                    </a:p>
+                  </a:txBody>
+                  <a:tcPr/>
+                </a:tc>
+                <a:extLst>
+                  <a:ext uri="{0D108BD9-81ED-4DB2-BD59-A6C34878D82A}">
+                    <a16:rowId xmlns:a16="http://schemas.microsoft.com/office/drawing/2014/main" val="90594398"/>
+                  </a:ext>
+                </a:extLst>
+              </a:tr>
+              <a:tr h="370840">
+                <a:tc>
+                  <a:txBody>
+                    <a:bodyPr/>
+                    <a:lstStyle/>
+                    <a:p>
+                      <a:r>
+                        <a:rPr lang="en-US" sz="1400" dirty="0">
+                          <a:solidFill>
+                            <a:schemeClr val="accent6">
+                              <a:lumMod val="75000"/>
+                            </a:schemeClr>
+                          </a:solidFill>
+                        </a:rPr>
+                        <a:t>3</a:t>
+                      </a:r>
+                    </a:p>
+                  </a:txBody>
+                  <a:tcPr/>
+                </a:tc>
+                <a:tc>
+                  <a:txBody>
+                    <a:bodyPr/>
+                    <a:lstStyle/>
+                    <a:p>
+                      <a:r>
+                        <a:rPr lang="en-US" sz="1400" dirty="0">
+                          <a:solidFill>
+                            <a:schemeClr val="accent6">
+                              <a:lumMod val="75000"/>
+                            </a:schemeClr>
+                          </a:solidFill>
+                        </a:rPr>
+                        <a:t>NVA_SRC_IP</a:t>
+                      </a:r>
+                    </a:p>
+                  </a:txBody>
+                  <a:tcPr/>
+                </a:tc>
+                <a:tc>
+                  <a:txBody>
+                    <a:bodyPr/>
+                    <a:lstStyle/>
+                    <a:p>
+                      <a:r>
+                        <a:rPr lang="en-US" sz="1400" dirty="0">
+                          <a:solidFill>
+                            <a:schemeClr val="accent6">
+                              <a:lumMod val="75000"/>
+                            </a:schemeClr>
+                          </a:solidFill>
+                        </a:rPr>
+                        <a:t>10.2.1.4</a:t>
+                      </a:r>
+                      <a:endParaRPr lang="en-US" sz="1400" dirty="0">
+                        <a:solidFill>
+                          <a:schemeClr val="accent6">
+                            <a:lumMod val="75000"/>
+                          </a:schemeClr>
+                        </a:solidFill>
+                      </a:endParaRPr>
+                    </a:p>
+                  </a:txBody>
+                  <a:tcPr/>
+                </a:tc>
+                <a:extLst>
+                  <a:ext uri="{0D108BD9-81ED-4DB2-BD59-A6C34878D82A}">
+                    <a16:rowId xmlns:a16="http://schemas.microsoft.com/office/drawing/2014/main" val="3409019899"/>
+                  </a:ext>
+                </a:extLst>
+              </a:tr>
+              <a:tr h="370840">
+                <a:tc>
+                  <a:txBody>
+                    <a:bodyPr/>
+                    <a:lstStyle/>
+                    <a:p>
+                      <a:r>
+                        <a:rPr lang="en-US" sz="1400" dirty="0">
+                          <a:solidFill>
+                            <a:srgbClr val="C00000"/>
+                          </a:solidFill>
+                        </a:rPr>
+                        <a:t>4</a:t>
+                      </a:r>
+                    </a:p>
+                  </a:txBody>
+                  <a:tcPr/>
+                </a:tc>
+                <a:tc>
+                  <a:txBody>
+                    <a:bodyPr/>
+                    <a:lstStyle/>
+                    <a:p>
+                      <a:r>
+                        <a:rPr lang="en-US" sz="1400" dirty="0">
+                          <a:solidFill>
+                            <a:srgbClr val="C00000"/>
+                          </a:solidFill>
+                        </a:rPr>
+                        <a:t>10.2.1.4</a:t>
+                      </a:r>
+                    </a:p>
+                  </a:txBody>
+                  <a:tcPr/>
+                </a:tc>
+                <a:tc>
+                  <a:txBody>
+                    <a:bodyPr/>
+                    <a:lstStyle/>
+                    <a:p>
+                      <a:r>
+                        <a:rPr lang="en-US" sz="1400" dirty="0">
+                          <a:solidFill>
+                            <a:srgbClr val="C00000"/>
+                          </a:solidFill>
+                        </a:rPr>
+                        <a:t>NVA_SRC_IP</a:t>
+                      </a:r>
+                    </a:p>
+                  </a:txBody>
+                  <a:tcPr/>
+                </a:tc>
+                <a:extLst>
+                  <a:ext uri="{0D108BD9-81ED-4DB2-BD59-A6C34878D82A}">
+                    <a16:rowId xmlns:a16="http://schemas.microsoft.com/office/drawing/2014/main" val="2008290650"/>
+                  </a:ext>
+                </a:extLst>
+              </a:tr>
+              <a:tr h="370840">
+                <a:tc>
+                  <a:txBody>
+                    <a:bodyPr/>
+                    <a:lstStyle/>
+                    <a:p>
+                      <a:r>
+                        <a:rPr lang="en-US" sz="1400" dirty="0">
+                          <a:solidFill>
+                            <a:srgbClr val="C00000"/>
+                          </a:solidFill>
+                        </a:rPr>
+                        <a:t>5</a:t>
+                      </a:r>
+                    </a:p>
+                  </a:txBody>
+                  <a:tcPr/>
+                </a:tc>
+                <a:tc>
+                  <a:txBody>
+                    <a:bodyPr/>
+                    <a:lstStyle/>
+                    <a:p>
+                      <a:r>
+                        <a:rPr lang="en-US" sz="1400" dirty="0">
+                          <a:solidFill>
+                            <a:srgbClr val="C00000"/>
+                          </a:solidFill>
+                        </a:rPr>
+                        <a:t>10.2.1.4</a:t>
+                      </a:r>
+                    </a:p>
+                  </a:txBody>
+                  <a:tcPr/>
+                </a:tc>
+                <a:tc>
+                  <a:txBody>
+                    <a:bodyPr/>
+                    <a:lstStyle/>
+                    <a:p>
+                      <a:r>
+                        <a:rPr lang="en-US" sz="1400" dirty="0">
+                          <a:solidFill>
+                            <a:srgbClr val="C00000"/>
+                          </a:solidFill>
+                        </a:rPr>
+                        <a:t>10.1.1.4</a:t>
+                      </a:r>
+                    </a:p>
+                  </a:txBody>
+                  <a:tcPr/>
+                </a:tc>
+                <a:extLst>
+                  <a:ext uri="{0D108BD9-81ED-4DB2-BD59-A6C34878D82A}">
+                    <a16:rowId xmlns:a16="http://schemas.microsoft.com/office/drawing/2014/main" val="1410994534"/>
+                  </a:ext>
+                </a:extLst>
+              </a:tr>
+            </a:tbl>
+          </a:graphicData>
+        </a:graphic>
+      </p:graphicFrame>
+      <p:grpSp>
+        <p:nvGrpSpPr>
+          <p:cNvPr id="76" name="Group 75"/>
+          <p:cNvGrpSpPr/>
+          <p:nvPr/>
+        </p:nvGrpSpPr>
+        <p:grpSpPr>
+          <a:xfrm>
+            <a:off x="4329433" y="4947175"/>
+            <a:ext cx="344918" cy="461665"/>
+            <a:chOff x="8696325" y="704345"/>
+            <a:chExt cx="344918" cy="461665"/>
+          </a:xfrm>
+        </p:grpSpPr>
+        <p:sp>
+          <p:nvSpPr>
+            <p:cNvPr id="77" name="Oval 76"/>
+            <p:cNvSpPr/>
+            <p:nvPr/>
+          </p:nvSpPr>
+          <p:spPr>
+            <a:xfrm>
+              <a:off x="8696325" y="767113"/>
+              <a:ext cx="317310" cy="348582"/>
+            </a:xfrm>
+            <a:prstGeom prst="ellipse">
+              <a:avLst/>
+            </a:prstGeom>
+            <a:solidFill>
+              <a:schemeClr val="accent6">
+                <a:lumMod val="75000"/>
+              </a:schemeClr>
+            </a:solidFill>
+            <a:ln>
+              <a:solidFill>
+                <a:schemeClr val="accent6">
+                  <a:lumMod val="75000"/>
+                </a:schemeClr>
+              </a:solidFill>
+            </a:ln>
+          </p:spPr>
+          <p:style>
+            <a:lnRef idx="2">
+              <a:schemeClr val="accent1">
+                <a:shade val="50000"/>
+              </a:schemeClr>
+            </a:lnRef>
+            <a:fillRef idx="1">
+              <a:schemeClr val="accent1"/>
+            </a:fillRef>
+            <a:effectRef idx="0">
+              <a:schemeClr val="accent1"/>
+            </a:effectRef>
+            <a:fontRef idx="minor">
+              <a:schemeClr val="lt1"/>
+            </a:fontRef>
+          </p:style>
+          <p:txBody>
+            <a:bodyPr rtlCol="0" anchor="ctr"/>
+            <a:lstStyle/>
+            <a:p>
+              <a:pPr algn="ctr"/>
+              <a:endParaRPr lang="en-US"/>
+            </a:p>
+          </p:txBody>
+        </p:sp>
+        <p:sp>
+          <p:nvSpPr>
+            <p:cNvPr id="78" name="TextBox 77"/>
+            <p:cNvSpPr txBox="1"/>
+            <p:nvPr/>
+          </p:nvSpPr>
+          <p:spPr>
+            <a:xfrm>
+              <a:off x="8701085" y="704345"/>
+              <a:ext cx="340158" cy="461665"/>
+            </a:xfrm>
+            <a:prstGeom prst="rect">
+              <a:avLst/>
+            </a:prstGeom>
+            <a:noFill/>
+          </p:spPr>
+          <p:txBody>
+            <a:bodyPr wrap="none" rtlCol="0">
+              <a:spAutoFit/>
+            </a:bodyPr>
+            <a:lstStyle/>
+            <a:p>
+              <a:r>
+                <a:rPr lang="en-US" sz="2400" b="1" dirty="0">
+                  <a:solidFill>
+                    <a:schemeClr val="bg1"/>
+                  </a:solidFill>
+                </a:rPr>
+                <a:t>1</a:t>
+              </a:r>
+            </a:p>
+          </p:txBody>
+        </p:sp>
+      </p:grpSp>
+      <p:grpSp>
+        <p:nvGrpSpPr>
+          <p:cNvPr id="79" name="Group 78"/>
+          <p:cNvGrpSpPr/>
+          <p:nvPr/>
+        </p:nvGrpSpPr>
+        <p:grpSpPr>
+          <a:xfrm>
+            <a:off x="4873702" y="3191167"/>
+            <a:ext cx="344918" cy="461665"/>
+            <a:chOff x="8696325" y="704345"/>
+            <a:chExt cx="344918" cy="461665"/>
+          </a:xfrm>
+        </p:grpSpPr>
+        <p:sp>
+          <p:nvSpPr>
+            <p:cNvPr id="80" name="Oval 79"/>
+            <p:cNvSpPr/>
+            <p:nvPr/>
+          </p:nvSpPr>
+          <p:spPr>
+            <a:xfrm>
+              <a:off x="8696325" y="767113"/>
+              <a:ext cx="317310" cy="348582"/>
+            </a:xfrm>
+            <a:prstGeom prst="ellipse">
+              <a:avLst/>
+            </a:prstGeom>
+            <a:solidFill>
+              <a:schemeClr val="accent6">
+                <a:lumMod val="75000"/>
+              </a:schemeClr>
+            </a:solidFill>
+            <a:ln>
+              <a:solidFill>
+                <a:schemeClr val="accent6">
+                  <a:lumMod val="75000"/>
+                </a:schemeClr>
+              </a:solidFill>
+            </a:ln>
+          </p:spPr>
+          <p:style>
+            <a:lnRef idx="2">
+              <a:schemeClr val="accent1">
+                <a:shade val="50000"/>
+              </a:schemeClr>
+            </a:lnRef>
+            <a:fillRef idx="1">
+              <a:schemeClr val="accent1"/>
+            </a:fillRef>
+            <a:effectRef idx="0">
+              <a:schemeClr val="accent1"/>
+            </a:effectRef>
+            <a:fontRef idx="minor">
+              <a:schemeClr val="lt1"/>
+            </a:fontRef>
+          </p:style>
+          <p:txBody>
+            <a:bodyPr rtlCol="0" anchor="ctr"/>
+            <a:lstStyle/>
+            <a:p>
+              <a:pPr algn="ctr"/>
+              <a:endParaRPr lang="en-US"/>
+            </a:p>
+          </p:txBody>
+        </p:sp>
+        <p:sp>
+          <p:nvSpPr>
+            <p:cNvPr id="81" name="TextBox 80"/>
+            <p:cNvSpPr txBox="1"/>
+            <p:nvPr/>
+          </p:nvSpPr>
+          <p:spPr>
+            <a:xfrm>
+              <a:off x="8701085" y="704345"/>
+              <a:ext cx="340158" cy="461665"/>
+            </a:xfrm>
+            <a:prstGeom prst="rect">
+              <a:avLst/>
+            </a:prstGeom>
+            <a:noFill/>
+          </p:spPr>
+          <p:txBody>
+            <a:bodyPr wrap="none" rtlCol="0">
+              <a:spAutoFit/>
+            </a:bodyPr>
+            <a:lstStyle/>
+            <a:p>
+              <a:r>
+                <a:rPr lang="en-US" sz="2400" b="1" dirty="0">
+                  <a:solidFill>
+                    <a:schemeClr val="bg1"/>
+                  </a:solidFill>
+                </a:rPr>
+                <a:t>2</a:t>
+              </a:r>
+            </a:p>
+          </p:txBody>
+        </p:sp>
+      </p:grpSp>
+      <p:grpSp>
+        <p:nvGrpSpPr>
+          <p:cNvPr id="82" name="Group 81"/>
+          <p:cNvGrpSpPr/>
+          <p:nvPr/>
+        </p:nvGrpSpPr>
+        <p:grpSpPr>
+          <a:xfrm>
+            <a:off x="5981280" y="2606331"/>
+            <a:ext cx="344918" cy="461665"/>
+            <a:chOff x="8696325" y="704345"/>
+            <a:chExt cx="344918" cy="461665"/>
+          </a:xfrm>
+        </p:grpSpPr>
+        <p:sp>
+          <p:nvSpPr>
+            <p:cNvPr id="83" name="Oval 82"/>
+            <p:cNvSpPr/>
+            <p:nvPr/>
+          </p:nvSpPr>
+          <p:spPr>
+            <a:xfrm>
+              <a:off x="8696325" y="767113"/>
+              <a:ext cx="317310" cy="348582"/>
+            </a:xfrm>
+            <a:prstGeom prst="ellipse">
+              <a:avLst/>
+            </a:prstGeom>
+            <a:solidFill>
+              <a:schemeClr val="accent6">
+                <a:lumMod val="75000"/>
+              </a:schemeClr>
+            </a:solidFill>
+            <a:ln>
+              <a:solidFill>
+                <a:schemeClr val="accent6">
+                  <a:lumMod val="75000"/>
+                </a:schemeClr>
+              </a:solidFill>
+            </a:ln>
+          </p:spPr>
+          <p:style>
+            <a:lnRef idx="2">
+              <a:schemeClr val="accent1">
+                <a:shade val="50000"/>
+              </a:schemeClr>
+            </a:lnRef>
+            <a:fillRef idx="1">
+              <a:schemeClr val="accent1"/>
+            </a:fillRef>
+            <a:effectRef idx="0">
+              <a:schemeClr val="accent1"/>
+            </a:effectRef>
+            <a:fontRef idx="minor">
+              <a:schemeClr val="lt1"/>
+            </a:fontRef>
+          </p:style>
+          <p:txBody>
+            <a:bodyPr rtlCol="0" anchor="ctr"/>
+            <a:lstStyle/>
+            <a:p>
+              <a:pPr algn="ctr"/>
+              <a:endParaRPr lang="en-US"/>
+            </a:p>
+          </p:txBody>
+        </p:sp>
+        <p:sp>
+          <p:nvSpPr>
+            <p:cNvPr id="84" name="TextBox 83"/>
+            <p:cNvSpPr txBox="1"/>
+            <p:nvPr/>
+          </p:nvSpPr>
+          <p:spPr>
+            <a:xfrm>
+              <a:off x="8701085" y="704345"/>
+              <a:ext cx="340158" cy="461665"/>
+            </a:xfrm>
+            <a:prstGeom prst="rect">
+              <a:avLst/>
+            </a:prstGeom>
+            <a:noFill/>
+          </p:spPr>
+          <p:txBody>
+            <a:bodyPr wrap="none" rtlCol="0">
+              <a:spAutoFit/>
+            </a:bodyPr>
+            <a:lstStyle/>
+            <a:p>
+              <a:r>
+                <a:rPr lang="en-US" sz="2400" b="1" dirty="0">
+                  <a:solidFill>
+                    <a:schemeClr val="bg1"/>
+                  </a:solidFill>
+                </a:rPr>
+                <a:t>3</a:t>
+              </a:r>
+            </a:p>
+          </p:txBody>
+        </p:sp>
+      </p:grpSp>
+      <p:grpSp>
+        <p:nvGrpSpPr>
+          <p:cNvPr id="88" name="Group 87"/>
+          <p:cNvGrpSpPr/>
+          <p:nvPr/>
+        </p:nvGrpSpPr>
+        <p:grpSpPr>
+          <a:xfrm>
+            <a:off x="7372587" y="2640297"/>
+            <a:ext cx="344918" cy="461665"/>
+            <a:chOff x="8696325" y="704345"/>
+            <a:chExt cx="344918" cy="461665"/>
+          </a:xfrm>
+          <a:solidFill>
+            <a:srgbClr val="C00000"/>
+          </a:solidFill>
+        </p:grpSpPr>
+        <p:sp>
+          <p:nvSpPr>
+            <p:cNvPr id="89" name="Oval 88"/>
+            <p:cNvSpPr/>
+            <p:nvPr/>
+          </p:nvSpPr>
+          <p:spPr>
+            <a:xfrm>
+              <a:off x="8696325" y="767113"/>
+              <a:ext cx="317310" cy="348582"/>
+            </a:xfrm>
+            <a:prstGeom prst="ellipse">
+              <a:avLst/>
+            </a:prstGeom>
+            <a:grpFill/>
+            <a:ln>
+              <a:noFill/>
+            </a:ln>
+          </p:spPr>
+          <p:style>
+            <a:lnRef idx="2">
+              <a:schemeClr val="accent1">
+                <a:shade val="50000"/>
+              </a:schemeClr>
+            </a:lnRef>
+            <a:fillRef idx="1">
+              <a:schemeClr val="accent1"/>
+            </a:fillRef>
+            <a:effectRef idx="0">
+              <a:schemeClr val="accent1"/>
+            </a:effectRef>
+            <a:fontRef idx="minor">
+              <a:schemeClr val="lt1"/>
+            </a:fontRef>
+          </p:style>
+          <p:txBody>
+            <a:bodyPr rtlCol="0" anchor="ctr"/>
+            <a:lstStyle/>
+            <a:p>
+              <a:pPr algn="ctr"/>
+              <a:endParaRPr lang="en-US"/>
+            </a:p>
+          </p:txBody>
+        </p:sp>
+        <p:sp>
+          <p:nvSpPr>
+            <p:cNvPr id="90" name="TextBox 89"/>
+            <p:cNvSpPr txBox="1"/>
+            <p:nvPr/>
+          </p:nvSpPr>
+          <p:spPr>
+            <a:xfrm>
+              <a:off x="8701085" y="704345"/>
+              <a:ext cx="340158" cy="461665"/>
+            </a:xfrm>
+            <a:prstGeom prst="rect">
+              <a:avLst/>
+            </a:prstGeom>
+            <a:noFill/>
+            <a:ln>
+              <a:noFill/>
+            </a:ln>
+          </p:spPr>
+          <p:txBody>
+            <a:bodyPr wrap="none" rtlCol="0">
+              <a:spAutoFit/>
+            </a:bodyPr>
+            <a:lstStyle/>
+            <a:p>
+              <a:r>
+                <a:rPr lang="en-US" sz="2400" b="1" dirty="0">
+                  <a:solidFill>
+                    <a:schemeClr val="bg1"/>
+                  </a:solidFill>
+                </a:rPr>
+                <a:t>4</a:t>
+              </a:r>
+            </a:p>
+          </p:txBody>
+        </p:sp>
+      </p:grpSp>
+      <p:grpSp>
+        <p:nvGrpSpPr>
+          <p:cNvPr id="91" name="Group 90"/>
+          <p:cNvGrpSpPr/>
+          <p:nvPr/>
+        </p:nvGrpSpPr>
+        <p:grpSpPr>
+          <a:xfrm>
+            <a:off x="3865785" y="3882902"/>
+            <a:ext cx="344919" cy="461665"/>
+            <a:chOff x="8696325" y="704345"/>
+            <a:chExt cx="344919" cy="461665"/>
+          </a:xfrm>
+          <a:solidFill>
+            <a:srgbClr val="C00000"/>
+          </a:solidFill>
+        </p:grpSpPr>
+        <p:sp>
+          <p:nvSpPr>
+            <p:cNvPr id="92" name="Oval 91"/>
+            <p:cNvSpPr/>
+            <p:nvPr/>
+          </p:nvSpPr>
+          <p:spPr>
+            <a:xfrm>
+              <a:off x="8696325" y="767113"/>
+              <a:ext cx="317310" cy="348582"/>
+            </a:xfrm>
+            <a:prstGeom prst="ellipse">
+              <a:avLst/>
+            </a:prstGeom>
+            <a:grpFill/>
+            <a:ln>
+              <a:noFill/>
+            </a:ln>
+          </p:spPr>
+          <p:style>
+            <a:lnRef idx="2">
+              <a:schemeClr val="accent1">
+                <a:shade val="50000"/>
+              </a:schemeClr>
+            </a:lnRef>
+            <a:fillRef idx="1">
+              <a:schemeClr val="accent1"/>
+            </a:fillRef>
+            <a:effectRef idx="0">
+              <a:schemeClr val="accent1"/>
+            </a:effectRef>
+            <a:fontRef idx="minor">
+              <a:schemeClr val="lt1"/>
+            </a:fontRef>
+          </p:style>
+          <p:txBody>
+            <a:bodyPr rtlCol="0" anchor="ctr"/>
+            <a:lstStyle/>
+            <a:p>
+              <a:pPr algn="ctr"/>
+              <a:endParaRPr lang="en-US"/>
+            </a:p>
+          </p:txBody>
+        </p:sp>
+        <p:sp>
+          <p:nvSpPr>
+            <p:cNvPr id="93" name="TextBox 92"/>
+            <p:cNvSpPr txBox="1"/>
+            <p:nvPr/>
+          </p:nvSpPr>
+          <p:spPr>
+            <a:xfrm>
+              <a:off x="8701085" y="704345"/>
+              <a:ext cx="340159" cy="461665"/>
+            </a:xfrm>
+            <a:prstGeom prst="rect">
+              <a:avLst/>
+            </a:prstGeom>
+            <a:noFill/>
+            <a:ln>
+              <a:noFill/>
+            </a:ln>
+          </p:spPr>
+          <p:txBody>
+            <a:bodyPr wrap="none" rtlCol="0">
+              <a:spAutoFit/>
+            </a:bodyPr>
+            <a:lstStyle/>
+            <a:p>
+              <a:r>
+                <a:rPr lang="en-US" sz="2400" b="1" dirty="0">
+                  <a:solidFill>
+                    <a:schemeClr val="bg1"/>
+                  </a:solidFill>
+                </a:rPr>
+                <a:t>5</a:t>
+              </a:r>
+            </a:p>
+          </p:txBody>
+        </p:sp>
+      </p:grpSp>
+    </p:spTree>
+    <p:extLst>
+      <p:ext uri="{BB962C8B-B14F-4D97-AF65-F5344CB8AC3E}">
+        <p14:creationId xmlns:p14="http://schemas.microsoft.com/office/powerpoint/2010/main" val="2134064919"/>
       </p:ext>
     </p:extLst>
   </p:cSld>
@@ -7038,6 +11673,13 @@
                 </a:srgbClr>
               </a:clrTo>
             </a:clrChange>
+            <a:duotone>
+              <a:schemeClr val="accent6">
+                <a:shade val="45000"/>
+                <a:satMod val="135000"/>
+              </a:schemeClr>
+              <a:prstClr val="white"/>
+            </a:duotone>
             <a:extLst>
               <a:ext uri="{28A0092B-C50C-407E-A947-70E740481C1C}">
                 <a14:useLocalDpi xmlns:a14="http://schemas.microsoft.com/office/drawing/2010/main" val="0"/>
@@ -7114,6 +11756,50 @@
               <a:t>(10.4.2.101, .102)</a:t>
             </a:r>
             <a:endParaRPr lang="en-US" sz="1200" dirty="0">
+              <a:solidFill>
+                <a:schemeClr val="tx1">
+                  <a:lumMod val="65000"/>
+                  <a:lumOff val="35000"/>
+                </a:schemeClr>
+              </a:solidFill>
+            </a:endParaRPr>
+          </a:p>
+        </p:txBody>
+      </p:sp>
+      <p:sp>
+        <p:nvSpPr>
+          <p:cNvPr id="52" name="TextBox 51"/>
+          <p:cNvSpPr txBox="1"/>
+          <p:nvPr/>
+        </p:nvSpPr>
+        <p:spPr>
+          <a:xfrm rot="5400000">
+            <a:off x="5837869" y="2858465"/>
+            <a:ext cx="1108637" cy="307777"/>
+          </a:xfrm>
+          <a:prstGeom prst="rect">
+            <a:avLst/>
+          </a:prstGeom>
+          <a:noFill/>
+        </p:spPr>
+        <p:txBody>
+          <a:bodyPr wrap="none" rtlCol="0">
+            <a:spAutoFit/>
+          </a:bodyPr>
+          <a:lstStyle/>
+          <a:p>
+            <a:r>
+              <a:rPr lang="de-DE" sz="1400" dirty="0">
+                <a:solidFill>
+                  <a:schemeClr val="tx1">
+                    <a:lumMod val="65000"/>
+                    <a:lumOff val="35000"/>
+                  </a:schemeClr>
+                </a:solidFill>
+              </a:rPr>
+              <a:t>vnet peering</a:t>
+            </a:r>
+            <a:endParaRPr lang="en-US" sz="1400" dirty="0">
               <a:solidFill>
                 <a:schemeClr val="tx1">
                   <a:lumMod val="65000"/>
@@ -10890,6 +15576,13 @@
                 </a:srgbClr>
               </a:clrTo>
             </a:clrChange>
+            <a:duotone>
+              <a:schemeClr val="accent6">
+                <a:shade val="45000"/>
+                <a:satMod val="135000"/>
+              </a:schemeClr>
+              <a:prstClr val="white"/>
+            </a:duotone>
             <a:extLst>
               <a:ext uri="{28A0092B-C50C-407E-A947-70E740481C1C}">
                 <a14:useLocalDpi xmlns:a14="http://schemas.microsoft.com/office/drawing/2010/main" val="0"/>
@@ -11913,6 +16606,13 @@
                 </a:srgbClr>
               </a:clrTo>
             </a:clrChange>
+            <a:duotone>
+              <a:schemeClr val="accent6">
+                <a:shade val="45000"/>
+                <a:satMod val="135000"/>
+              </a:schemeClr>
+              <a:prstClr val="white"/>
+            </a:duotone>
             <a:extLst>
               <a:ext uri="{28A0092B-C50C-407E-A947-70E740481C1C}">
                 <a14:useLocalDpi xmlns:a14="http://schemas.microsoft.com/office/drawing/2010/main" val="0"/>
@@ -15630,6 +20330,13 @@
                 </a:srgbClr>
               </a:clrTo>
             </a:clrChange>
+            <a:duotone>
+              <a:schemeClr val="accent6">
+                <a:shade val="45000"/>
+                <a:satMod val="135000"/>
+              </a:schemeClr>
+              <a:prstClr val="white"/>
+            </a:duotone>
             <a:extLst>
               <a:ext uri="{28A0092B-C50C-407E-A947-70E740481C1C}">
                 <a14:useLocalDpi xmlns:a14="http://schemas.microsoft.com/office/drawing/2010/main" val="0"/>
@@ -15934,7 +20641,7 @@
           <a:p>
             <a:r>
               <a:rPr lang="de-DE" dirty="0"/>
-              <a:t>lab 2: NVA Scale out</a:t>
+              <a:t>NVA Scale out</a:t>
             </a:r>
             <a:endParaRPr lang="en-US" dirty="0"/>
           </a:p>
@@ -16581,6 +21288,13 @@
                 </a:srgbClr>
               </a:clrTo>
             </a:clrChange>
+            <a:duotone>
+              <a:schemeClr val="accent6">
+                <a:shade val="45000"/>
+                <a:satMod val="135000"/>
+              </a:schemeClr>
+              <a:prstClr val="white"/>
+            </a:duotone>
             <a:extLst>
               <a:ext uri="{28A0092B-C50C-407E-A947-70E740481C1C}">
                 <a14:useLocalDpi xmlns:a14="http://schemas.microsoft.com/office/drawing/2010/main" val="0"/>
@@ -16994,6 +21708,13 @@
                 </a:srgbClr>
               </a:clrTo>
             </a:clrChange>
+            <a:duotone>
+              <a:schemeClr val="accent6">
+                <a:shade val="45000"/>
+                <a:satMod val="135000"/>
+              </a:schemeClr>
+              <a:prstClr val="white"/>
+            </a:duotone>
             <a:extLst>
               <a:ext uri="{28A0092B-C50C-407E-A947-70E740481C1C}">
                 <a14:useLocalDpi xmlns:a14="http://schemas.microsoft.com/office/drawing/2010/main" val="0"/>
@@ -17031,7 +21752,7 @@
           </p:cNvPicPr>
           <p:nvPr/>
         </p:nvPicPr>
-        <p:blipFill>
+        <p:blipFill rotWithShape="1">
           <a:blip r:embed="rId3">
             <a:extLst>
               <a:ext uri="{28A0092B-C50C-407E-A947-70E740481C1C}">
@@ -17039,15 +21760,13 @@
               </a:ext>
             </a:extLst>
           </a:blip>
-          <a:srcRect/>
-          <a:stretch>
-            <a:fillRect/>
-          </a:stretch>
+          <a:srcRect l="20489" r="23142"/>
+          <a:stretch/>
         </p:blipFill>
         <p:spPr bwMode="auto">
           <a:xfrm>
-            <a:off x="4508684" y="2494294"/>
-            <a:ext cx="1580966" cy="830007"/>
+            <a:off x="4832606" y="2494294"/>
+            <a:ext cx="891178" cy="830007"/>
           </a:xfrm>
           <a:prstGeom prst="rect">
             <a:avLst/>

</xml_diff>